<commit_message>
Adding milestone version of presentation
</commit_message>
<xml_diff>
--- a/MicroservicesITWeek2017.pptx
+++ b/MicroservicesITWeek2017.pptx
@@ -5,10 +5,10 @@
     <p:sldMasterId id="2147483730" r:id="rId4"/>
   </p:sldMasterIdLst>
   <p:notesMasterIdLst>
-    <p:notesMasterId r:id="rId36"/>
+    <p:notesMasterId r:id="rId39"/>
   </p:notesMasterIdLst>
   <p:handoutMasterIdLst>
-    <p:handoutMasterId r:id="rId37"/>
+    <p:handoutMasterId r:id="rId40"/>
   </p:handoutMasterIdLst>
   <p:sldIdLst>
     <p:sldId id="478" r:id="rId5"/>
@@ -39,9 +39,12 @@
     <p:sldId id="523" r:id="rId30"/>
     <p:sldId id="521" r:id="rId31"/>
     <p:sldId id="524" r:id="rId32"/>
-    <p:sldId id="503" r:id="rId33"/>
-    <p:sldId id="496" r:id="rId34"/>
-    <p:sldId id="446" r:id="rId35"/>
+    <p:sldId id="525" r:id="rId33"/>
+    <p:sldId id="526" r:id="rId34"/>
+    <p:sldId id="527" r:id="rId35"/>
+    <p:sldId id="503" r:id="rId36"/>
+    <p:sldId id="496" r:id="rId37"/>
+    <p:sldId id="446" r:id="rId38"/>
   </p:sldIdLst>
   <p:sldSz cx="6858000" cy="5143500"/>
   <p:notesSz cx="6858000" cy="9144000"/>
@@ -436,6 +439,34 @@
 </p:cmLst>
 </file>
 
+<file path=ppt/comments/comment3.xml><?xml version="1.0" encoding="utf-8"?>
+<p:cmLst xmlns:a="http://schemas.openxmlformats.org/drawingml/2006/main" xmlns:r="http://schemas.openxmlformats.org/officeDocument/2006/relationships" xmlns:p="http://schemas.openxmlformats.org/presentationml/2006/main">
+  <p:cm authorId="3" dt="2017-03-11T20:52:15.577" idx="2">
+    <p:pos x="10" y="10"/>
+    <p:text>revisit</p:text>
+    <p:extLst>
+      <p:ext uri="{C676402C-5697-4E1C-873F-D02D1690AC5C}">
+        <p15:threadingInfo xmlns:p15="http://schemas.microsoft.com/office/powerpoint/2012/main" timeZoneBias="-180"/>
+      </p:ext>
+    </p:extLst>
+  </p:cm>
+</p:cmLst>
+</file>
+
+<file path=ppt/comments/comment4.xml><?xml version="1.0" encoding="utf-8"?>
+<p:cmLst xmlns:a="http://schemas.openxmlformats.org/drawingml/2006/main" xmlns:r="http://schemas.openxmlformats.org/officeDocument/2006/relationships" xmlns:p="http://schemas.openxmlformats.org/presentationml/2006/main">
+  <p:cm authorId="3" dt="2017-03-11T20:52:15.577" idx="2">
+    <p:pos x="10" y="10"/>
+    <p:text>revisit</p:text>
+    <p:extLst>
+      <p:ext uri="{C676402C-5697-4E1C-873F-D02D1690AC5C}">
+        <p15:threadingInfo xmlns:p15="http://schemas.microsoft.com/office/powerpoint/2012/main" timeZoneBias="-180"/>
+      </p:ext>
+    </p:extLst>
+  </p:cm>
+</p:cmLst>
+</file>
+
 <file path=ppt/handoutMasters/handoutMaster1.xml><?xml version="1.0" encoding="utf-8"?>
 <p:handoutMaster xmlns:a="http://schemas.openxmlformats.org/drawingml/2006/main" xmlns:r="http://schemas.openxmlformats.org/officeDocument/2006/relationships" xmlns:p="http://schemas.openxmlformats.org/presentationml/2006/main">
   <p:cSld>
@@ -519,7 +550,7 @@
             <a:fld id="{7F5E9BF7-95E4-A242-BA1D-05FDCF603BE6}" type="datetime1">
               <a:rPr lang="en-US" smtClean="0"/>
               <a:pPr/>
-              <a:t>3/11/2017</a:t>
+              <a:t>3/14/2017</a:t>
             </a:fld>
             <a:endParaRPr lang="en-US"/>
           </a:p>
@@ -687,7 +718,7 @@
             <a:fld id="{165DBCB1-0306-AD41-9452-11E7C08D5C04}" type="datetime1">
               <a:rPr lang="en-US" smtClean="0"/>
               <a:pPr/>
-              <a:t>3/11/2017</a:t>
+              <a:t>3/14/2017</a:t>
             </a:fld>
             <a:endParaRPr lang="en-US"/>
           </a:p>
@@ -3499,86 +3530,53 @@
           <a:p>
             <a:r>
               <a:rPr lang="en-US" dirty="0" smtClean="0"/>
-              <a:t>Each </a:t>
-            </a:r>
-            <a:r>
-              <a:rPr lang="en-US" dirty="0" err="1" smtClean="0"/>
-              <a:t>microservice</a:t>
-            </a:r>
-            <a:r>
-              <a:rPr lang="en-US" dirty="0" smtClean="0"/>
-              <a:t> can use its own storage</a:t>
+              <a:t>Initially I wanted to speak</a:t>
             </a:r>
             <a:r>
               <a:rPr lang="en-US" baseline="0" dirty="0" smtClean="0"/>
-              <a:t> and own kind of storage, the one that fits </a:t>
-            </a:r>
-            <a:r>
-              <a:rPr lang="en-US" baseline="0" dirty="0" err="1" smtClean="0"/>
-              <a:t>microservice</a:t>
-            </a:r>
+              <a:t> about scaling on this slide. And you probably would want to hear about scaling, how we dynamically add new servers, distribute the load etc.</a:t>
+            </a:r>
+          </a:p>
+          <a:p>
             <a:r>
               <a:rPr lang="en-US" baseline="0" dirty="0" smtClean="0"/>
-              <a:t> needs better.</a:t>
+              <a:t>But in reality…</a:t>
             </a:r>
           </a:p>
           <a:p>
             <a:r>
               <a:rPr lang="en-US" baseline="0" dirty="0" smtClean="0"/>
-              <a:t>Also the thing called as Polyglot Persistence is welcomed. With polyglot persistence different parts of information is distributed between separate databases. </a:t>
+              <a:t>In reality our applications are not targeted for huge loads and as result, high performance is not the major requirement for most of our applications. Instead, the major requirement is reliability (maybe this explains why the whole talk was devoted mainly to how handle failures and simplify system diagnostics).</a:t>
             </a:r>
           </a:p>
           <a:p>
             <a:r>
               <a:rPr lang="en-US" baseline="0" dirty="0" smtClean="0"/>
-              <a:t>In our case, author articles (which are complex documents) are stored in object storage (</a:t>
-            </a:r>
-            <a:r>
-              <a:rPr lang="en-US" baseline="0" dirty="0" err="1" smtClean="0"/>
-              <a:t>MongoDB</a:t>
-            </a:r>
+              <a:t>One more good point in ensuring reliability of a system is failover.</a:t>
+            </a:r>
+          </a:p>
+          <a:p>
             <a:r>
               <a:rPr lang="en-US" baseline="0" dirty="0" smtClean="0"/>
-              <a:t>) and orders we store in transactional relational storage (</a:t>
-            </a:r>
-            <a:r>
-              <a:rPr lang="en-US" baseline="0" dirty="0" err="1" smtClean="0"/>
-              <a:t>PostgreSQL</a:t>
-            </a:r>
+              <a:t>For failover we use number 2. Each application or storage exists on production in two instances</a:t>
+            </a:r>
+          </a:p>
+          <a:p>
             <a:r>
               <a:rPr lang="en-US" baseline="0" dirty="0" smtClean="0"/>
-              <a:t>) which is better suited for transactions and reporting</a:t>
-            </a:r>
-            <a:r>
-              <a:rPr lang="ru-RU" baseline="0" dirty="0" smtClean="0"/>
-              <a:t>.</a:t>
-            </a:r>
-            <a:endParaRPr lang="en-US" baseline="0" dirty="0" smtClean="0"/>
+              <a:t>In front of tomcat we have amazon balancer to distribute the load and exclude one tomcat instance if it fails, redirecting all user requests to second instance</a:t>
+            </a:r>
           </a:p>
           <a:p>
             <a:r>
               <a:rPr lang="en-US" baseline="0" dirty="0" smtClean="0"/>
-              <a:t>The most important concept, shown on this slide – client of </a:t>
-            </a:r>
-            <a:r>
-              <a:rPr lang="en-US" baseline="0" dirty="0" err="1" smtClean="0"/>
-              <a:t>microservice</a:t>
-            </a:r>
+              <a:t>Scheduled activities that we run at fixed time should happen only once at a given time and we can’t explicitly turn it off on one instance of application, because if the instance with enabled jobs fails, we loose the scheduled activities. But quartz clustering feature allows to do failover – if application instance crashes, second instance will start running those scheduled activities</a:t>
+            </a:r>
+          </a:p>
+          <a:p>
             <a:r>
               <a:rPr lang="en-US" baseline="0" dirty="0" smtClean="0"/>
-              <a:t> never gets access to database directly. Instead it uses API exposed by </a:t>
-            </a:r>
-            <a:r>
-              <a:rPr lang="en-US" baseline="0" dirty="0" err="1" smtClean="0"/>
-              <a:t>microservice</a:t>
-            </a:r>
-            <a:r>
-              <a:rPr lang="en-US" baseline="0" dirty="0" smtClean="0"/>
-              <a:t> (most often it is </a:t>
-            </a:r>
-            <a:r>
-              <a:rPr lang="en-US" baseline="0" smtClean="0"/>
-              <a:t>REST).</a:t>
+              <a:t>Also there are cases when for example, we need to read file from ftp, process it and delete, but do this only once. And if we implement this consumer, it will run inside two application instances and start consuming the same file in parallel, what is not what we want. But if we implement consumer using Camel, it has a nice feature that allows an application to register in centralized service like zookeeper and enable routes that become active and consuming on one host only</a:t>
             </a:r>
             <a:endParaRPr lang="ru-RU" baseline="0" dirty="0" smtClean="0"/>
           </a:p>
@@ -3611,7 +3609,7 @@
     </p:spTree>
     <p:extLst>
       <p:ext uri="{BB962C8B-B14F-4D97-AF65-F5344CB8AC3E}">
-        <p14:creationId xmlns:p14="http://schemas.microsoft.com/office/powerpoint/2010/main" val="1578299573"/>
+        <p14:creationId xmlns:p14="http://schemas.microsoft.com/office/powerpoint/2010/main" val="178210190"/>
       </p:ext>
     </p:extLst>
   </p:cSld>
@@ -3640,7 +3638,7 @@
       </p:grpSpPr>
       <p:sp>
         <p:nvSpPr>
-          <p:cNvPr id="2" name="Slide Image Placeholder 1"/>
+          <p:cNvPr id="2" name="Образ слайда 1"/>
           <p:cNvSpPr>
             <a:spLocks noGrp="1" noRot="1" noChangeAspect="1"/>
           </p:cNvSpPr>
@@ -3648,16 +3646,11 @@
             <p:ph type="sldImg"/>
           </p:nvPr>
         </p:nvSpPr>
-        <p:spPr>
-          <a:xfrm>
-            <a:off x="1143000" y="685800"/>
-            <a:ext cx="4572000" cy="3429000"/>
-          </a:xfrm>
-        </p:spPr>
-      </p:sp>
-      <p:sp>
-        <p:nvSpPr>
-          <p:cNvPr id="3" name="Notes Placeholder 2"/>
+        <p:spPr/>
+      </p:sp>
+      <p:sp>
+        <p:nvSpPr>
+          <p:cNvPr id="3" name="Заметки 2"/>
           <p:cNvSpPr>
             <a:spLocks noGrp="1"/>
           </p:cNvSpPr>
@@ -3670,30 +3663,69 @@
           <a:bodyPr/>
           <a:lstStyle/>
           <a:p>
-            <a:pPr marL="0" marR="0" indent="0" algn="l" defTabSz="914400" rtl="0" eaLnBrk="1" fontAlgn="auto" latinLnBrk="0" hangingPunct="1">
-              <a:lnSpc>
-                <a:spcPct val="100000"/>
-              </a:lnSpc>
-              <a:spcBef>
-                <a:spcPts val="0"/>
-              </a:spcBef>
-              <a:spcAft>
-                <a:spcPts val="0"/>
-              </a:spcAft>
-              <a:buClrTx/>
-              <a:buSzTx/>
+            <a:pPr marL="0" indent="0">
               <a:buFontTx/>
               <a:buNone/>
-              <a:tabLst/>
-              <a:defRPr/>
             </a:pPr>
-            <a:endParaRPr lang="en-US" dirty="0"/>
-          </a:p>
-        </p:txBody>
-      </p:sp>
-      <p:sp>
-        <p:nvSpPr>
-          <p:cNvPr id="4" name="Slide Number Placeholder 3"/>
+            <a:r>
+              <a:rPr lang="en-US" dirty="0" smtClean="0"/>
+              <a:t>On</a:t>
+            </a:r>
+            <a:r>
+              <a:rPr lang="en-US" baseline="0" dirty="0" smtClean="0"/>
+              <a:t> this slide you can see the tech stack we are using on a project.</a:t>
+            </a:r>
+          </a:p>
+          <a:p>
+            <a:pPr marL="0" indent="0">
+              <a:buFontTx/>
+              <a:buNone/>
+            </a:pPr>
+            <a:r>
+              <a:rPr lang="en-US" baseline="0" dirty="0" smtClean="0"/>
+              <a:t>Key note here is that though </a:t>
+            </a:r>
+            <a:r>
+              <a:rPr lang="en-US" baseline="0" dirty="0" err="1" smtClean="0"/>
+              <a:t>microservices</a:t>
+            </a:r>
+            <a:r>
+              <a:rPr lang="en-US" baseline="0" dirty="0" smtClean="0"/>
+              <a:t> support and encourage polyglot persistence, polyglot platform (use other </a:t>
+            </a:r>
+            <a:r>
+              <a:rPr lang="en-US" baseline="0" dirty="0" err="1" smtClean="0"/>
+              <a:t>langs</a:t>
+            </a:r>
+            <a:r>
+              <a:rPr lang="en-US" baseline="0" dirty="0" smtClean="0"/>
+              <a:t> that suit better), polyglot pretty everything, we strive to have core technologies unified. So we do not use anything except java, we have only one build tool – </a:t>
+            </a:r>
+            <a:r>
+              <a:rPr lang="en-US" baseline="0" dirty="0" err="1" smtClean="0"/>
+              <a:t>gradle</a:t>
+            </a:r>
+            <a:r>
+              <a:rPr lang="en-US" baseline="0" dirty="0" smtClean="0"/>
+              <a:t>, deploy on tomcat only etc. We use one deploy tool, one monitoring tool, one log collecting tool. This helps to ensure we do not have duplication of tools that would require doubled IT support. This helps to ensure we have expertise – maybe not wide covering several similar tools, but narrow – specializing in one tool.</a:t>
+            </a:r>
+          </a:p>
+          <a:p>
+            <a:pPr marL="0" indent="0">
+              <a:buFontTx/>
+              <a:buNone/>
+            </a:pPr>
+            <a:r>
+              <a:rPr lang="en-US" baseline="0" dirty="0" smtClean="0"/>
+              <a:t>Event for persistence and integration (in the middle column of slide), project feels free to choose type of storage that suits better (be it document storage, file storage or search engine), but within the type of storage, there is only one approved option.</a:t>
+            </a:r>
+            <a:endParaRPr lang="ru-RU" dirty="0"/>
+          </a:p>
+        </p:txBody>
+      </p:sp>
+      <p:sp>
+        <p:nvSpPr>
+          <p:cNvPr id="4" name="Номер слайда 3"/>
           <p:cNvSpPr>
             <a:spLocks noGrp="1"/>
           </p:cNvSpPr>
@@ -3718,7 +3750,7 @@
     </p:spTree>
     <p:extLst>
       <p:ext uri="{BB962C8B-B14F-4D97-AF65-F5344CB8AC3E}">
-        <p14:creationId xmlns:p14="http://schemas.microsoft.com/office/powerpoint/2010/main" val="1347711957"/>
+        <p14:creationId xmlns:p14="http://schemas.microsoft.com/office/powerpoint/2010/main" val="4113613616"/>
       </p:ext>
     </p:extLst>
   </p:cSld>
@@ -3923,7 +3955,11 @@
           <a:bodyPr/>
           <a:lstStyle/>
           <a:p>
-            <a:endParaRPr lang="ru-RU"/>
+            <a:r>
+              <a:rPr lang="en-US" dirty="0" smtClean="0"/>
+              <a:t>16 applications / services</a:t>
+            </a:r>
+            <a:endParaRPr lang="ru-RU" dirty="0"/>
           </a:p>
         </p:txBody>
       </p:sp>
@@ -3946,6 +3982,434 @@
               <a:rPr lang="en-US" smtClean="0"/>
               <a:pPr/>
               <a:t>31</a:t>
+            </a:fld>
+            <a:endParaRPr lang="en-US"/>
+          </a:p>
+        </p:txBody>
+      </p:sp>
+    </p:spTree>
+    <p:extLst>
+      <p:ext uri="{BB962C8B-B14F-4D97-AF65-F5344CB8AC3E}">
+        <p14:creationId xmlns:p14="http://schemas.microsoft.com/office/powerpoint/2010/main" val="224973294"/>
+      </p:ext>
+    </p:extLst>
+  </p:cSld>
+  <p:clrMapOvr>
+    <a:masterClrMapping/>
+  </p:clrMapOvr>
+</p:notes>
+</file>
+
+<file path=ppt/notesSlides/notesSlide31.xml><?xml version="1.0" encoding="utf-8"?>
+<p:notes xmlns:a="http://schemas.openxmlformats.org/drawingml/2006/main" xmlns:r="http://schemas.openxmlformats.org/officeDocument/2006/relationships" xmlns:p="http://schemas.openxmlformats.org/presentationml/2006/main">
+  <p:cSld>
+    <p:spTree>
+      <p:nvGrpSpPr>
+        <p:cNvPr id="1" name=""/>
+        <p:cNvGrpSpPr/>
+        <p:nvPr/>
+      </p:nvGrpSpPr>
+      <p:grpSpPr>
+        <a:xfrm>
+          <a:off x="0" y="0"/>
+          <a:ext cx="0" cy="0"/>
+          <a:chOff x="0" y="0"/>
+          <a:chExt cx="0" cy="0"/>
+        </a:xfrm>
+      </p:grpSpPr>
+      <p:sp>
+        <p:nvSpPr>
+          <p:cNvPr id="2" name="Образ слайда 1"/>
+          <p:cNvSpPr>
+            <a:spLocks noGrp="1" noRot="1" noChangeAspect="1"/>
+          </p:cNvSpPr>
+          <p:nvPr>
+            <p:ph type="sldImg"/>
+          </p:nvPr>
+        </p:nvSpPr>
+        <p:spPr/>
+      </p:sp>
+      <p:sp>
+        <p:nvSpPr>
+          <p:cNvPr id="3" name="Заметки 2"/>
+          <p:cNvSpPr>
+            <a:spLocks noGrp="1"/>
+          </p:cNvSpPr>
+          <p:nvPr>
+            <p:ph type="body" idx="1"/>
+          </p:nvPr>
+        </p:nvSpPr>
+        <p:spPr/>
+        <p:txBody>
+          <a:bodyPr/>
+          <a:lstStyle/>
+          <a:p>
+            <a:pPr marL="171450" indent="-171450">
+              <a:buFontTx/>
+              <a:buChar char="-"/>
+            </a:pPr>
+            <a:r>
+              <a:rPr lang="en-US" dirty="0" smtClean="0"/>
+              <a:t>System is too big</a:t>
+            </a:r>
+          </a:p>
+          <a:p>
+            <a:pPr marL="514350" lvl="1" indent="-171450">
+              <a:buFontTx/>
+              <a:buChar char="-"/>
+            </a:pPr>
+            <a:r>
+              <a:rPr lang="en-US" dirty="0" smtClean="0"/>
+              <a:t>and it just does not fit on one</a:t>
+            </a:r>
+            <a:r>
+              <a:rPr lang="en-US" baseline="0" dirty="0" smtClean="0"/>
+              <a:t> server</a:t>
+            </a:r>
+            <a:endParaRPr lang="ru-RU" dirty="0" smtClean="0"/>
+          </a:p>
+          <a:p>
+            <a:pPr marL="171450" lvl="0" indent="-171450">
+              <a:buFontTx/>
+              <a:buChar char="-"/>
+            </a:pPr>
+            <a:r>
+              <a:rPr lang="en-US" dirty="0" smtClean="0"/>
+              <a:t>Team is too big</a:t>
+            </a:r>
+            <a:endParaRPr lang="ru-RU" baseline="0" dirty="0" smtClean="0"/>
+          </a:p>
+          <a:p>
+            <a:pPr marL="628650" lvl="1" indent="-171450">
+              <a:buFontTx/>
+              <a:buChar char="-"/>
+            </a:pPr>
+            <a:r>
+              <a:rPr lang="en-US" baseline="0" dirty="0" smtClean="0"/>
+              <a:t>And distributed</a:t>
+            </a:r>
+            <a:endParaRPr lang="ru-RU" dirty="0" smtClean="0"/>
+          </a:p>
+          <a:p>
+            <a:pPr marL="171450" indent="-171450">
+              <a:buFontTx/>
+              <a:buChar char="-"/>
+            </a:pPr>
+            <a:r>
+              <a:rPr lang="en-US" dirty="0" smtClean="0"/>
+              <a:t>System is</a:t>
+            </a:r>
+            <a:r>
+              <a:rPr lang="en-US" baseline="0" dirty="0" smtClean="0"/>
+              <a:t> too complicated</a:t>
+            </a:r>
+            <a:endParaRPr lang="ru-RU" dirty="0" smtClean="0"/>
+          </a:p>
+          <a:p>
+            <a:pPr marL="628650" lvl="1" indent="-171450">
+              <a:buFontTx/>
+              <a:buChar char="-"/>
+            </a:pPr>
+            <a:r>
+              <a:rPr lang="en-US" dirty="0" smtClean="0"/>
+              <a:t>Complicated to understand</a:t>
+            </a:r>
+            <a:endParaRPr lang="ru-RU" dirty="0" smtClean="0"/>
+          </a:p>
+          <a:p>
+            <a:pPr marL="628650" lvl="1" indent="-171450">
+              <a:buFontTx/>
+              <a:buChar char="-"/>
+            </a:pPr>
+            <a:r>
+              <a:rPr lang="en-US" dirty="0" smtClean="0"/>
+              <a:t>Complicated to develop</a:t>
+            </a:r>
+            <a:endParaRPr lang="ru-RU" dirty="0" smtClean="0"/>
+          </a:p>
+          <a:p>
+            <a:pPr marL="628650" lvl="1" indent="-171450">
+              <a:buFontTx/>
+              <a:buChar char="-"/>
+            </a:pPr>
+            <a:r>
+              <a:rPr lang="en-US" dirty="0" smtClean="0"/>
+              <a:t>Complicated to deploy</a:t>
+            </a:r>
+            <a:endParaRPr lang="ru-RU" dirty="0" smtClean="0"/>
+          </a:p>
+          <a:p>
+            <a:pPr marL="628650" lvl="1" indent="-171450">
+              <a:buFontTx/>
+              <a:buChar char="-"/>
+            </a:pPr>
+            <a:endParaRPr lang="ru-RU" dirty="0" smtClean="0"/>
+          </a:p>
+          <a:p>
+            <a:pPr marL="457200" lvl="1" indent="0">
+              <a:buFontTx/>
+              <a:buNone/>
+            </a:pPr>
+            <a:r>
+              <a:rPr lang="en-US" dirty="0" smtClean="0"/>
+              <a:t>In this case splitting</a:t>
+            </a:r>
+            <a:r>
+              <a:rPr lang="en-US" baseline="0" dirty="0" smtClean="0"/>
+              <a:t> it into services won’t solve the complexity problem but allows to abstract away</a:t>
+            </a:r>
+            <a:endParaRPr lang="ru-RU" dirty="0" smtClean="0"/>
+          </a:p>
+          <a:p>
+            <a:pPr marL="171450" lvl="0" indent="-171450">
+              <a:buFontTx/>
+              <a:buChar char="-"/>
+            </a:pPr>
+            <a:r>
+              <a:rPr lang="en-US" dirty="0" smtClean="0"/>
+              <a:t>System is too new</a:t>
+            </a:r>
+            <a:endParaRPr lang="ru-RU" baseline="0" dirty="0" smtClean="0"/>
+          </a:p>
+          <a:p>
+            <a:pPr marL="628650" lvl="1" indent="-171450">
+              <a:buFontTx/>
+              <a:buChar char="-"/>
+            </a:pPr>
+            <a:r>
+              <a:rPr lang="en-US" baseline="0" dirty="0" smtClean="0"/>
+              <a:t>Allows to isolate legacy applications as more </a:t>
+            </a:r>
+            <a:r>
+              <a:rPr lang="en-US" baseline="0" dirty="0" err="1" smtClean="0"/>
+              <a:t>microservices</a:t>
+            </a:r>
+            <a:endParaRPr lang="ru-RU" baseline="0" dirty="0" smtClean="0"/>
+          </a:p>
+          <a:p>
+            <a:pPr marL="1085850" lvl="2" indent="-171450">
+              <a:buFontTx/>
+              <a:buChar char="-"/>
+            </a:pPr>
+            <a:r>
+              <a:rPr lang="ru-RU" baseline="0" dirty="0" smtClean="0"/>
+              <a:t>Именно так и зародилось наше приложение</a:t>
+            </a:r>
+            <a:endParaRPr lang="ru-RU" dirty="0"/>
+          </a:p>
+        </p:txBody>
+      </p:sp>
+      <p:sp>
+        <p:nvSpPr>
+          <p:cNvPr id="4" name="Номер слайда 3"/>
+          <p:cNvSpPr>
+            <a:spLocks noGrp="1"/>
+          </p:cNvSpPr>
+          <p:nvPr>
+            <p:ph type="sldNum" sz="quarter" idx="10"/>
+          </p:nvPr>
+        </p:nvSpPr>
+        <p:spPr/>
+        <p:txBody>
+          <a:bodyPr/>
+          <a:lstStyle/>
+          <a:p>
+            <a:fld id="{7AE90029-A909-AD4E-9775-A0D64990AD22}" type="slidenum">
+              <a:rPr lang="en-US" smtClean="0"/>
+              <a:pPr/>
+              <a:t>32</a:t>
+            </a:fld>
+            <a:endParaRPr lang="en-US"/>
+          </a:p>
+        </p:txBody>
+      </p:sp>
+    </p:spTree>
+    <p:extLst>
+      <p:ext uri="{BB962C8B-B14F-4D97-AF65-F5344CB8AC3E}">
+        <p14:creationId xmlns:p14="http://schemas.microsoft.com/office/powerpoint/2010/main" val="1578299573"/>
+      </p:ext>
+    </p:extLst>
+  </p:cSld>
+  <p:clrMapOvr>
+    <a:masterClrMapping/>
+  </p:clrMapOvr>
+</p:notes>
+</file>
+
+<file path=ppt/notesSlides/notesSlide32.xml><?xml version="1.0" encoding="utf-8"?>
+<p:notes xmlns:a="http://schemas.openxmlformats.org/drawingml/2006/main" xmlns:r="http://schemas.openxmlformats.org/officeDocument/2006/relationships" xmlns:p="http://schemas.openxmlformats.org/presentationml/2006/main">
+  <p:cSld>
+    <p:spTree>
+      <p:nvGrpSpPr>
+        <p:cNvPr id="1" name=""/>
+        <p:cNvGrpSpPr/>
+        <p:nvPr/>
+      </p:nvGrpSpPr>
+      <p:grpSpPr>
+        <a:xfrm>
+          <a:off x="0" y="0"/>
+          <a:ext cx="0" cy="0"/>
+          <a:chOff x="0" y="0"/>
+          <a:chExt cx="0" cy="0"/>
+        </a:xfrm>
+      </p:grpSpPr>
+      <p:sp>
+        <p:nvSpPr>
+          <p:cNvPr id="2" name="Slide Image Placeholder 1"/>
+          <p:cNvSpPr>
+            <a:spLocks noGrp="1" noRot="1" noChangeAspect="1"/>
+          </p:cNvSpPr>
+          <p:nvPr>
+            <p:ph type="sldImg"/>
+          </p:nvPr>
+        </p:nvSpPr>
+        <p:spPr>
+          <a:xfrm>
+            <a:off x="1143000" y="685800"/>
+            <a:ext cx="4572000" cy="3429000"/>
+          </a:xfrm>
+        </p:spPr>
+      </p:sp>
+      <p:sp>
+        <p:nvSpPr>
+          <p:cNvPr id="3" name="Notes Placeholder 2"/>
+          <p:cNvSpPr>
+            <a:spLocks noGrp="1"/>
+          </p:cNvSpPr>
+          <p:nvPr>
+            <p:ph type="body" idx="1"/>
+          </p:nvPr>
+        </p:nvSpPr>
+        <p:spPr/>
+        <p:txBody>
+          <a:bodyPr/>
+          <a:lstStyle/>
+          <a:p>
+            <a:pPr marL="0" marR="0" indent="0" algn="l" defTabSz="914400" rtl="0" eaLnBrk="1" fontAlgn="auto" latinLnBrk="0" hangingPunct="1">
+              <a:lnSpc>
+                <a:spcPct val="100000"/>
+              </a:lnSpc>
+              <a:spcBef>
+                <a:spcPts val="0"/>
+              </a:spcBef>
+              <a:spcAft>
+                <a:spcPts val="0"/>
+              </a:spcAft>
+              <a:buClrTx/>
+              <a:buSzTx/>
+              <a:buFontTx/>
+              <a:buNone/>
+              <a:tabLst/>
+              <a:defRPr/>
+            </a:pPr>
+            <a:endParaRPr lang="en-US" dirty="0"/>
+          </a:p>
+        </p:txBody>
+      </p:sp>
+      <p:sp>
+        <p:nvSpPr>
+          <p:cNvPr id="4" name="Slide Number Placeholder 3"/>
+          <p:cNvSpPr>
+            <a:spLocks noGrp="1"/>
+          </p:cNvSpPr>
+          <p:nvPr>
+            <p:ph type="sldNum" sz="quarter" idx="10"/>
+          </p:nvPr>
+        </p:nvSpPr>
+        <p:spPr/>
+        <p:txBody>
+          <a:bodyPr/>
+          <a:lstStyle/>
+          <a:p>
+            <a:fld id="{7AE90029-A909-AD4E-9775-A0D64990AD22}" type="slidenum">
+              <a:rPr lang="en-US" smtClean="0"/>
+              <a:pPr/>
+              <a:t>33</a:t>
+            </a:fld>
+            <a:endParaRPr lang="en-US"/>
+          </a:p>
+        </p:txBody>
+      </p:sp>
+    </p:spTree>
+    <p:extLst>
+      <p:ext uri="{BB962C8B-B14F-4D97-AF65-F5344CB8AC3E}">
+        <p14:creationId xmlns:p14="http://schemas.microsoft.com/office/powerpoint/2010/main" val="1347711957"/>
+      </p:ext>
+    </p:extLst>
+  </p:cSld>
+  <p:clrMapOvr>
+    <a:masterClrMapping/>
+  </p:clrMapOvr>
+</p:notes>
+</file>
+
+<file path=ppt/notesSlides/notesSlide33.xml><?xml version="1.0" encoding="utf-8"?>
+<p:notes xmlns:a="http://schemas.openxmlformats.org/drawingml/2006/main" xmlns:r="http://schemas.openxmlformats.org/officeDocument/2006/relationships" xmlns:p="http://schemas.openxmlformats.org/presentationml/2006/main">
+  <p:cSld>
+    <p:spTree>
+      <p:nvGrpSpPr>
+        <p:cNvPr id="1" name=""/>
+        <p:cNvGrpSpPr/>
+        <p:nvPr/>
+      </p:nvGrpSpPr>
+      <p:grpSpPr>
+        <a:xfrm>
+          <a:off x="0" y="0"/>
+          <a:ext cx="0" cy="0"/>
+          <a:chOff x="0" y="0"/>
+          <a:chExt cx="0" cy="0"/>
+        </a:xfrm>
+      </p:grpSpPr>
+      <p:sp>
+        <p:nvSpPr>
+          <p:cNvPr id="2" name="Образ слайда 1"/>
+          <p:cNvSpPr>
+            <a:spLocks noGrp="1" noRot="1" noChangeAspect="1"/>
+          </p:cNvSpPr>
+          <p:nvPr>
+            <p:ph type="sldImg"/>
+          </p:nvPr>
+        </p:nvSpPr>
+        <p:spPr/>
+      </p:sp>
+      <p:sp>
+        <p:nvSpPr>
+          <p:cNvPr id="3" name="Заметки 2"/>
+          <p:cNvSpPr>
+            <a:spLocks noGrp="1"/>
+          </p:cNvSpPr>
+          <p:nvPr>
+            <p:ph type="body" idx="1"/>
+          </p:nvPr>
+        </p:nvSpPr>
+        <p:spPr/>
+        <p:txBody>
+          <a:bodyPr/>
+          <a:lstStyle/>
+          <a:p>
+            <a:endParaRPr lang="ru-RU"/>
+          </a:p>
+        </p:txBody>
+      </p:sp>
+      <p:sp>
+        <p:nvSpPr>
+          <p:cNvPr id="4" name="Номер слайда 3"/>
+          <p:cNvSpPr>
+            <a:spLocks noGrp="1"/>
+          </p:cNvSpPr>
+          <p:nvPr>
+            <p:ph type="sldNum" sz="quarter" idx="10"/>
+          </p:nvPr>
+        </p:nvSpPr>
+        <p:spPr/>
+        <p:txBody>
+          <a:bodyPr/>
+          <a:lstStyle/>
+          <a:p>
+            <a:fld id="{7AE90029-A909-AD4E-9775-A0D64990AD22}" type="slidenum">
+              <a:rPr lang="en-US" smtClean="0"/>
+              <a:pPr/>
+              <a:t>34</a:t>
             </a:fld>
             <a:endParaRPr lang="en-US"/>
           </a:p>
@@ -4836,7 +5300,6 @@
               <a:rPr lang="ru-RU" baseline="0" dirty="0" smtClean="0"/>
               <a:t> позволяют горизонтально масштабироваться</a:t>
             </a:r>
-            <a:endParaRPr lang="ru-RU" baseline="0" dirty="0" smtClean="0"/>
           </a:p>
         </p:txBody>
       </p:sp>
@@ -10484,7 +10947,6 @@
               <a:rPr lang="en-US" dirty="0"/>
               <a:t>Interaction</a:t>
             </a:r>
-            <a:endParaRPr lang="en-US" dirty="0"/>
           </a:p>
         </p:txBody>
       </p:sp>
@@ -10820,13 +11282,6 @@
               </a:rPr>
               <a:t>Services interaction</a:t>
             </a:r>
-            <a:endParaRPr lang="en-US" sz="3200" dirty="0">
-              <a:solidFill>
-                <a:schemeClr val="bg1">
-                  <a:lumMod val="75000"/>
-                </a:schemeClr>
-              </a:solidFill>
-            </a:endParaRPr>
           </a:p>
           <a:p>
             <a:pPr marL="457200" indent="-457200">
@@ -10936,7 +11391,7 @@
         </p:nvSpPr>
         <p:spPr>
           <a:xfrm>
-            <a:off x="266459" y="1234738"/>
+            <a:off x="266459" y="942638"/>
             <a:ext cx="8432800" cy="3908762"/>
           </a:xfrm>
           <a:prstGeom prst="rect">
@@ -10960,11 +11415,7 @@
             </a:pPr>
             <a:r>
               <a:rPr lang="en-US" sz="2400" dirty="0" smtClean="0"/>
-              <a:t>As </a:t>
-            </a:r>
-            <a:r>
-              <a:rPr lang="en-US" sz="2400" dirty="0" smtClean="0"/>
-              <a:t>fast as possible</a:t>
+              <a:t>As fast as possible</a:t>
             </a:r>
           </a:p>
           <a:p>
@@ -11100,7 +11551,6 @@
               <a:rPr lang="en-US" sz="2000" dirty="0" smtClean="0"/>
               <a:t>Guava in-process cache</a:t>
             </a:r>
-            <a:endParaRPr lang="en-US" sz="2000" dirty="0" smtClean="0"/>
           </a:p>
           <a:p>
             <a:pPr marL="1371600" lvl="2" indent="-457200">
@@ -11135,7 +11585,7 @@
         </p:nvSpPr>
         <p:spPr>
           <a:xfrm>
-            <a:off x="1028401" y="2593853"/>
+            <a:off x="1028401" y="2301753"/>
             <a:ext cx="1298778" cy="679477"/>
           </a:xfrm>
           <a:prstGeom prst="roundRect">
@@ -11217,7 +11667,7 @@
         </p:nvSpPr>
         <p:spPr>
           <a:xfrm>
-            <a:off x="2898683" y="2566058"/>
+            <a:off x="2898683" y="2273958"/>
             <a:ext cx="1584176" cy="679477"/>
           </a:xfrm>
           <a:prstGeom prst="roundRect">
@@ -11299,7 +11749,7 @@
         </p:nvSpPr>
         <p:spPr>
           <a:xfrm>
-            <a:off x="5138932" y="2566058"/>
+            <a:off x="5138932" y="2273958"/>
             <a:ext cx="1368152" cy="696601"/>
           </a:xfrm>
           <a:prstGeom prst="roundRect">
@@ -11381,7 +11831,7 @@
         </p:nvCxnSpPr>
         <p:spPr>
           <a:xfrm>
-            <a:off x="2293308" y="2755591"/>
+            <a:off x="2293308" y="2463491"/>
             <a:ext cx="603397" cy="13683"/>
           </a:xfrm>
           <a:prstGeom prst="straightConnector1">
@@ -11409,7 +11859,7 @@
         </p:nvCxnSpPr>
         <p:spPr>
           <a:xfrm>
-            <a:off x="2329373" y="3046404"/>
+            <a:off x="2329373" y="2754304"/>
             <a:ext cx="1080120" cy="0"/>
           </a:xfrm>
           <a:prstGeom prst="straightConnector1">
@@ -11438,7 +11888,7 @@
         </p:nvSpPr>
         <p:spPr>
           <a:xfrm>
-            <a:off x="2328307" y="2439964"/>
+            <a:off x="2328307" y="2147864"/>
             <a:ext cx="530915" cy="307777"/>
           </a:xfrm>
           <a:prstGeom prst="rect">
@@ -11505,7 +11955,7 @@
         </p:nvCxnSpPr>
         <p:spPr>
           <a:xfrm flipV="1">
-            <a:off x="166939" y="2769274"/>
+            <a:off x="166939" y="2477174"/>
             <a:ext cx="861462" cy="2983"/>
           </a:xfrm>
           <a:prstGeom prst="straightConnector1">
@@ -11533,7 +11983,7 @@
         </p:nvCxnSpPr>
         <p:spPr>
           <a:xfrm>
-            <a:off x="166939" y="3060289"/>
+            <a:off x="166939" y="2768189"/>
             <a:ext cx="1080120" cy="0"/>
           </a:xfrm>
           <a:prstGeom prst="straightConnector1">
@@ -11562,7 +12012,7 @@
         </p:nvSpPr>
         <p:spPr>
           <a:xfrm>
-            <a:off x="391848" y="2412170"/>
+            <a:off x="391848" y="2120070"/>
             <a:ext cx="530915" cy="307777"/>
           </a:xfrm>
           <a:prstGeom prst="rect">
@@ -11629,7 +12079,7 @@
         </p:nvCxnSpPr>
         <p:spPr>
           <a:xfrm flipV="1">
-            <a:off x="4427590" y="2905796"/>
+            <a:off x="4427590" y="2613696"/>
             <a:ext cx="716027" cy="7494"/>
           </a:xfrm>
           <a:prstGeom prst="straightConnector1">
@@ -11657,7 +12107,7 @@
         </p:nvSpPr>
         <p:spPr>
           <a:xfrm>
-            <a:off x="4482859" y="2474634"/>
+            <a:off x="4482859" y="2182534"/>
             <a:ext cx="625492" cy="307777"/>
           </a:xfrm>
           <a:prstGeom prst="rect">
@@ -12573,17 +13023,7 @@
                 <a:latin typeface="Trebuchet MS"/>
                 <a:cs typeface="Trebuchet MS"/>
               </a:rPr>
-              <a:t> </a:t>
-            </a:r>
-            <a:r>
-              <a:rPr lang="ru-RU" dirty="0" smtClean="0">
-                <a:solidFill>
-                  <a:schemeClr val="accent1"/>
-                </a:solidFill>
-                <a:latin typeface="Trebuchet MS"/>
-                <a:cs typeface="Trebuchet MS"/>
-              </a:rPr>
-              <a:t>+ </a:t>
+              <a:t> + </a:t>
             </a:r>
             <a:r>
               <a:rPr lang="en-US" dirty="0" smtClean="0">
@@ -13704,17 +14144,7 @@
                 <a:latin typeface="Trebuchet MS"/>
                 <a:cs typeface="Trebuchet MS"/>
               </a:rPr>
-              <a:t> </a:t>
-            </a:r>
-            <a:r>
-              <a:rPr lang="ru-RU" dirty="0" smtClean="0">
-                <a:solidFill>
-                  <a:schemeClr val="accent1"/>
-                </a:solidFill>
-                <a:latin typeface="Trebuchet MS"/>
-                <a:cs typeface="Trebuchet MS"/>
-              </a:rPr>
-              <a:t>+ </a:t>
+              <a:t> + </a:t>
             </a:r>
             <a:r>
               <a:rPr lang="en-US" dirty="0" smtClean="0">
@@ -14829,17 +15259,7 @@
                 <a:latin typeface="Trebuchet MS"/>
                 <a:cs typeface="Trebuchet MS"/>
               </a:rPr>
-              <a:t> </a:t>
-            </a:r>
-            <a:r>
-              <a:rPr lang="ru-RU" dirty="0" smtClean="0">
-                <a:solidFill>
-                  <a:schemeClr val="accent1"/>
-                </a:solidFill>
-                <a:latin typeface="Trebuchet MS"/>
-                <a:cs typeface="Trebuchet MS"/>
-              </a:rPr>
-              <a:t>+ </a:t>
+              <a:t> + </a:t>
             </a:r>
             <a:r>
               <a:rPr lang="en-US" dirty="0" smtClean="0">
@@ -15948,17 +16368,7 @@
                 <a:latin typeface="Trebuchet MS"/>
                 <a:cs typeface="Trebuchet MS"/>
               </a:rPr>
-              <a:t> </a:t>
-            </a:r>
-            <a:r>
-              <a:rPr lang="ru-RU" dirty="0" smtClean="0">
-                <a:solidFill>
-                  <a:schemeClr val="accent6"/>
-                </a:solidFill>
-                <a:latin typeface="Trebuchet MS"/>
-                <a:cs typeface="Trebuchet MS"/>
-              </a:rPr>
-              <a:t>+ </a:t>
+              <a:t> + </a:t>
             </a:r>
             <a:r>
               <a:rPr lang="en-US" dirty="0" smtClean="0">
@@ -17061,14 +17471,7 @@
                 <a:latin typeface="Trebuchet MS"/>
                 <a:cs typeface="Trebuchet MS"/>
               </a:rPr>
-              <a:t> </a:t>
-            </a:r>
-            <a:r>
-              <a:rPr lang="ru-RU" dirty="0" smtClean="0">
-                <a:latin typeface="Trebuchet MS"/>
-                <a:cs typeface="Trebuchet MS"/>
-              </a:rPr>
-              <a:t>+ </a:t>
+              <a:t> + </a:t>
             </a:r>
             <a:r>
               <a:rPr lang="en-US" dirty="0" smtClean="0">
@@ -18168,14 +18571,7 @@
                 <a:latin typeface="Trebuchet MS"/>
                 <a:cs typeface="Trebuchet MS"/>
               </a:rPr>
-              <a:t> </a:t>
-            </a:r>
-            <a:r>
-              <a:rPr lang="ru-RU" dirty="0" smtClean="0">
-                <a:latin typeface="Trebuchet MS"/>
-                <a:cs typeface="Trebuchet MS"/>
-              </a:rPr>
-              <a:t>+ </a:t>
+              <a:t> + </a:t>
             </a:r>
             <a:r>
               <a:rPr lang="en-US" dirty="0" smtClean="0">
@@ -19275,14 +19671,7 @@
                 <a:latin typeface="Trebuchet MS"/>
                 <a:cs typeface="Trebuchet MS"/>
               </a:rPr>
-              <a:t> </a:t>
-            </a:r>
-            <a:r>
-              <a:rPr lang="ru-RU" dirty="0" smtClean="0">
-                <a:latin typeface="Trebuchet MS"/>
-                <a:cs typeface="Trebuchet MS"/>
-              </a:rPr>
-              <a:t>+ </a:t>
+              <a:t> + </a:t>
             </a:r>
             <a:r>
               <a:rPr lang="en-US" dirty="0" smtClean="0">
@@ -20093,7 +20482,7 @@
         </p:nvSpPr>
         <p:spPr>
           <a:xfrm>
-            <a:off x="264695" y="699516"/>
+            <a:off x="264695" y="788416"/>
             <a:ext cx="6593305" cy="4068806"/>
           </a:xfrm>
           <a:prstGeom prst="rect">
@@ -20369,7 +20758,7 @@
         </p:blipFill>
         <p:spPr bwMode="auto">
           <a:xfrm>
-            <a:off x="5104408" y="1348232"/>
+            <a:off x="5104408" y="1437132"/>
             <a:ext cx="1728192" cy="774086"/>
           </a:xfrm>
           <a:prstGeom prst="rect">
@@ -20441,7 +20830,7 @@
         </p:nvSpPr>
         <p:spPr>
           <a:xfrm>
-            <a:off x="264695" y="610616"/>
+            <a:off x="264695" y="699516"/>
             <a:ext cx="6593305" cy="3859518"/>
           </a:xfrm>
           <a:prstGeom prst="rect">
@@ -20664,7 +21053,7 @@
         </p:blipFill>
         <p:spPr bwMode="auto">
           <a:xfrm>
-            <a:off x="2382664" y="1076106"/>
+            <a:off x="2382664" y="1165006"/>
             <a:ext cx="1512168" cy="468052"/>
           </a:xfrm>
           <a:prstGeom prst="rect">
@@ -20728,7 +21117,7 @@
         </p:blipFill>
         <p:spPr bwMode="auto">
           <a:xfrm>
-            <a:off x="5104408" y="3097546"/>
+            <a:off x="5104408" y="3186446"/>
             <a:ext cx="1498600" cy="889418"/>
           </a:xfrm>
           <a:prstGeom prst="rect">
@@ -21212,23 +21601,7 @@
                 <a:uLnTx/>
                 <a:uFillTx/>
               </a:rPr>
-              <a:t>X </a:t>
-            </a:r>
-            <a:r>
-              <a:rPr kumimoji="0" lang="en-US" sz="1800" b="0" i="0" u="none" strike="noStrike" kern="0" cap="none" spc="0" normalizeH="0" baseline="0" noProof="0" dirty="0" smtClean="0">
-                <a:ln>
-                  <a:noFill/>
-                </a:ln>
-                <a:solidFill>
-                  <a:schemeClr val="bg1">
-                    <a:lumMod val="65000"/>
-                  </a:schemeClr>
-                </a:solidFill>
-                <a:effectLst/>
-                <a:uLnTx/>
-                <a:uFillTx/>
-              </a:rPr>
-              <a:t>attempts</a:t>
+              <a:t>X attempts</a:t>
             </a:r>
             <a:r>
               <a:rPr kumimoji="0" lang="ru-RU" sz="1800" b="0" i="0" u="none" strike="noStrike" kern="0" cap="none" spc="0" normalizeH="0" baseline="0" noProof="0" dirty="0" smtClean="0">
@@ -22649,23 +23022,7 @@
                 <a:uLnTx/>
                 <a:uFillTx/>
               </a:rPr>
-              <a:t>X </a:t>
-            </a:r>
-            <a:r>
-              <a:rPr kumimoji="0" lang="en-US" sz="1800" b="0" i="0" u="none" strike="noStrike" kern="0" cap="none" spc="0" normalizeH="0" baseline="0" noProof="0" dirty="0" smtClean="0">
-                <a:ln>
-                  <a:noFill/>
-                </a:ln>
-                <a:solidFill>
-                  <a:schemeClr val="bg1">
-                    <a:lumMod val="65000"/>
-                  </a:schemeClr>
-                </a:solidFill>
-                <a:effectLst/>
-                <a:uLnTx/>
-                <a:uFillTx/>
-              </a:rPr>
-              <a:t>attempts</a:t>
+              <a:t>X attempts</a:t>
             </a:r>
             <a:r>
               <a:rPr kumimoji="0" lang="ru-RU" sz="1800" b="0" i="0" u="none" strike="noStrike" kern="0" cap="none" spc="0" normalizeH="0" baseline="0" noProof="0" dirty="0" smtClean="0">
@@ -24060,21 +24417,7 @@
                 <a:uLnTx/>
                 <a:uFillTx/>
               </a:rPr>
-              <a:t>X </a:t>
-            </a:r>
-            <a:r>
-              <a:rPr kumimoji="0" lang="en-US" sz="1800" b="0" i="0" u="none" strike="noStrike" kern="0" cap="none" spc="0" normalizeH="0" baseline="0" noProof="0" dirty="0" smtClean="0">
-                <a:ln>
-                  <a:noFill/>
-                </a:ln>
-                <a:solidFill>
-                  <a:schemeClr val="accent6"/>
-                </a:solidFill>
-                <a:effectLst/>
-                <a:uLnTx/>
-                <a:uFillTx/>
-              </a:rPr>
-              <a:t>attempts</a:t>
+              <a:t>X attempts</a:t>
             </a:r>
             <a:r>
               <a:rPr kumimoji="0" lang="ru-RU" sz="1800" b="0" i="0" u="none" strike="noStrike" kern="0" cap="none" spc="0" normalizeH="0" baseline="0" noProof="0" dirty="0" smtClean="0">
@@ -25462,18 +25805,7 @@
                 <a:uLnTx/>
                 <a:uFillTx/>
               </a:rPr>
-              <a:t>X </a:t>
-            </a:r>
-            <a:r>
-              <a:rPr kumimoji="0" lang="en-US" sz="1800" b="0" i="0" u="none" strike="noStrike" kern="0" cap="none" spc="0" normalizeH="0" baseline="0" noProof="0" dirty="0" smtClean="0">
-                <a:ln>
-                  <a:noFill/>
-                </a:ln>
-                <a:effectLst/>
-                <a:uLnTx/>
-                <a:uFillTx/>
-              </a:rPr>
-              <a:t>attempts</a:t>
+              <a:t>X attempts</a:t>
             </a:r>
             <a:r>
               <a:rPr kumimoji="0" lang="ru-RU" sz="1800" b="0" i="0" u="none" strike="noStrike" kern="0" cap="none" spc="0" normalizeH="0" baseline="0" noProof="0" dirty="0" smtClean="0">
@@ -26851,18 +27183,7 @@
                 <a:uLnTx/>
                 <a:uFillTx/>
               </a:rPr>
-              <a:t>X </a:t>
-            </a:r>
-            <a:r>
-              <a:rPr kumimoji="0" lang="en-US" sz="1800" b="0" i="0" u="none" strike="noStrike" kern="0" cap="none" spc="0" normalizeH="0" baseline="0" noProof="0" dirty="0" smtClean="0">
-                <a:ln>
-                  <a:noFill/>
-                </a:ln>
-                <a:effectLst/>
-                <a:uLnTx/>
-                <a:uFillTx/>
-              </a:rPr>
-              <a:t>attempts</a:t>
+              <a:t>X attempts</a:t>
             </a:r>
             <a:r>
               <a:rPr kumimoji="0" lang="ru-RU" sz="1800" b="0" i="0" u="none" strike="noStrike" kern="0" cap="none" spc="0" normalizeH="0" baseline="0" noProof="0" dirty="0" smtClean="0">
@@ -28216,18 +28537,7 @@
                 <a:uLnTx/>
                 <a:uFillTx/>
               </a:rPr>
-              <a:t>X </a:t>
-            </a:r>
-            <a:r>
-              <a:rPr kumimoji="0" lang="en-US" sz="1800" b="0" i="0" u="none" strike="noStrike" kern="0" cap="none" spc="0" normalizeH="0" baseline="0" noProof="0" dirty="0" smtClean="0">
-                <a:ln>
-                  <a:noFill/>
-                </a:ln>
-                <a:effectLst/>
-                <a:uLnTx/>
-                <a:uFillTx/>
-              </a:rPr>
-              <a:t>attempts</a:t>
+              <a:t>X attempts</a:t>
             </a:r>
             <a:r>
               <a:rPr kumimoji="0" lang="ru-RU" sz="1800" b="0" i="0" u="none" strike="noStrike" kern="0" cap="none" spc="0" normalizeH="0" baseline="0" noProof="0" dirty="0" smtClean="0">
@@ -29197,183 +29507,314 @@
           <a:lstStyle/>
           <a:p>
             <a:r>
-              <a:rPr lang="en-US" u="sng" dirty="0"/>
-              <a:t>Decentralized Data</a:t>
+              <a:rPr lang="en-US" dirty="0" smtClean="0"/>
+              <a:t>Failover</a:t>
             </a:r>
             <a:endParaRPr lang="en-US" dirty="0"/>
           </a:p>
         </p:txBody>
       </p:sp>
-      <p:sp>
-        <p:nvSpPr>
-          <p:cNvPr id="4" name="Прямоугольник 3"/>
-          <p:cNvSpPr/>
-          <p:nvPr/>
-        </p:nvSpPr>
-        <p:spPr>
+      <p:pic>
+        <p:nvPicPr>
+          <p:cNvPr id="5" name="Picture 4" descr="Похожее изображение"/>
+          <p:cNvPicPr>
+            <a:picLocks noChangeAspect="1" noChangeArrowheads="1"/>
+          </p:cNvPicPr>
+          <p:nvPr/>
+        </p:nvPicPr>
+        <p:blipFill>
+          <a:blip r:embed="rId3">
+            <a:extLst>
+              <a:ext uri="{28A0092B-C50C-407E-A947-70E740481C1C}">
+                <a14:useLocalDpi xmlns:a14="http://schemas.microsoft.com/office/drawing/2010/main" val="0"/>
+              </a:ext>
+            </a:extLst>
+          </a:blip>
+          <a:srcRect/>
+          <a:stretch>
+            <a:fillRect/>
+          </a:stretch>
+        </p:blipFill>
+        <p:spPr bwMode="auto">
           <a:xfrm>
-            <a:off x="120937" y="685172"/>
-            <a:ext cx="8369605" cy="2246769"/>
+            <a:off x="1852265" y="892327"/>
+            <a:ext cx="1749425" cy="890812"/>
           </a:xfrm>
           <a:prstGeom prst="rect">
             <a:avLst/>
           </a:prstGeom>
-        </p:spPr>
-        <p:txBody>
-          <a:bodyPr wrap="square">
+          <a:noFill/>
+          <a:extLst>
+            <a:ext uri="{909E8E84-426E-40DD-AFC4-6F175D3DCCD1}">
+              <a14:hiddenFill xmlns:a14="http://schemas.microsoft.com/office/drawing/2010/main">
+                <a:solidFill>
+                  <a:srgbClr val="FFFFFF"/>
+                </a:solidFill>
+              </a14:hiddenFill>
+            </a:ext>
+          </a:extLst>
+        </p:spPr>
+      </p:pic>
+      <p:pic>
+        <p:nvPicPr>
+          <p:cNvPr id="6" name="Picture 12" descr="Картинки по запросу tomcat 8"/>
+          <p:cNvPicPr>
+            <a:picLocks noChangeAspect="1" noChangeArrowheads="1"/>
+          </p:cNvPicPr>
+          <p:nvPr/>
+        </p:nvPicPr>
+        <p:blipFill>
+          <a:blip r:embed="rId4">
+            <a:extLst>
+              <a:ext uri="{28A0092B-C50C-407E-A947-70E740481C1C}">
+                <a14:useLocalDpi xmlns:a14="http://schemas.microsoft.com/office/drawing/2010/main" val="0"/>
+              </a:ext>
+            </a:extLst>
+          </a:blip>
+          <a:srcRect/>
+          <a:stretch>
+            <a:fillRect/>
+          </a:stretch>
+        </p:blipFill>
+        <p:spPr bwMode="auto">
+          <a:xfrm>
+            <a:off x="5470591" y="989204"/>
+            <a:ext cx="892645" cy="636615"/>
+          </a:xfrm>
+          <a:prstGeom prst="rect">
+            <a:avLst/>
+          </a:prstGeom>
+          <a:noFill/>
+          <a:extLst>
+            <a:ext uri="{909E8E84-426E-40DD-AFC4-6F175D3DCCD1}">
+              <a14:hiddenFill xmlns:a14="http://schemas.microsoft.com/office/drawing/2010/main">
+                <a:solidFill>
+                  <a:srgbClr val="FFFFFF"/>
+                </a:solidFill>
+              </a14:hiddenFill>
+            </a:ext>
+          </a:extLst>
+        </p:spPr>
+      </p:pic>
+      <p:pic>
+        <p:nvPicPr>
+          <p:cNvPr id="7" name="Picture 30" descr="Картинки по запросу postgresql"/>
+          <p:cNvPicPr>
+            <a:picLocks noChangeAspect="1" noChangeArrowheads="1"/>
+          </p:cNvPicPr>
+          <p:nvPr/>
+        </p:nvPicPr>
+        <p:blipFill>
+          <a:blip r:embed="rId5">
+            <a:extLst>
+              <a:ext uri="{28A0092B-C50C-407E-A947-70E740481C1C}">
+                <a14:useLocalDpi xmlns:a14="http://schemas.microsoft.com/office/drawing/2010/main" val="0"/>
+              </a:ext>
+            </a:extLst>
+          </a:blip>
+          <a:srcRect/>
+          <a:stretch>
+            <a:fillRect/>
+          </a:stretch>
+        </p:blipFill>
+        <p:spPr bwMode="auto">
+          <a:xfrm>
+            <a:off x="3663132" y="955042"/>
+            <a:ext cx="1535762" cy="704940"/>
+          </a:xfrm>
+          <a:prstGeom prst="rect">
+            <a:avLst/>
+          </a:prstGeom>
+          <a:noFill/>
+          <a:extLst>
+            <a:ext uri="{909E8E84-426E-40DD-AFC4-6F175D3DCCD1}">
+              <a14:hiddenFill xmlns:a14="http://schemas.microsoft.com/office/drawing/2010/main">
+                <a:solidFill>
+                  <a:srgbClr val="FFFFFF"/>
+                </a:solidFill>
+              </a14:hiddenFill>
+            </a:ext>
+          </a:extLst>
+        </p:spPr>
+      </p:pic>
+      <p:sp>
+        <p:nvSpPr>
+          <p:cNvPr id="2" name="TextBox 1"/>
+          <p:cNvSpPr txBox="1"/>
+          <p:nvPr/>
+        </p:nvSpPr>
+        <p:spPr>
+          <a:xfrm>
+            <a:off x="190500" y="584237"/>
+            <a:ext cx="1912140" cy="1446550"/>
+          </a:xfrm>
+          <a:prstGeom prst="rect">
+            <a:avLst/>
+          </a:prstGeom>
+          <a:noFill/>
+        </p:spPr>
+        <p:txBody>
+          <a:bodyPr wrap="square" rtlCol="0">
             <a:spAutoFit/>
           </a:bodyPr>
           <a:lstStyle/>
           <a:p>
-            <a:pPr marL="457200" lvl="0" indent="-457200" defTabSz="914400">
-              <a:spcBef>
-                <a:spcPct val="20000"/>
-              </a:spcBef>
-              <a:buClr>
-                <a:schemeClr val="accent3">
-                  <a:lumMod val="75000"/>
-                </a:schemeClr>
-              </a:buClr>
-              <a:buFont typeface="Arial" pitchFamily="34" charset="0"/>
+            <a:r>
+              <a:rPr lang="en-US" sz="8800" dirty="0" smtClean="0"/>
+              <a:t>2 </a:t>
+            </a:r>
+            <a:endParaRPr lang="ru-RU" sz="8800" dirty="0"/>
+          </a:p>
+        </p:txBody>
+      </p:sp>
+      <p:sp>
+        <p:nvSpPr>
+          <p:cNvPr id="11" name="Умножение 10"/>
+          <p:cNvSpPr/>
+          <p:nvPr/>
+        </p:nvSpPr>
+        <p:spPr>
+          <a:xfrm>
+            <a:off x="946382" y="850312"/>
+            <a:ext cx="914400" cy="914400"/>
+          </a:xfrm>
+          <a:prstGeom prst="mathMultiply">
+            <a:avLst/>
+          </a:prstGeom>
+          <a:solidFill>
+            <a:schemeClr val="tx1"/>
+          </a:solidFill>
+          <a:effectLst/>
+        </p:spPr>
+        <p:style>
+          <a:lnRef idx="1">
+            <a:schemeClr val="accent1"/>
+          </a:lnRef>
+          <a:fillRef idx="3">
+            <a:schemeClr val="accent1"/>
+          </a:fillRef>
+          <a:effectRef idx="2">
+            <a:schemeClr val="accent1"/>
+          </a:effectRef>
+          <a:fontRef idx="minor">
+            <a:schemeClr val="lt1"/>
+          </a:fontRef>
+        </p:style>
+        <p:txBody>
+          <a:bodyPr rtlCol="0" anchor="ctr"/>
+          <a:lstStyle/>
+          <a:p>
+            <a:pPr algn="ctr"/>
+            <a:endParaRPr lang="ru-RU"/>
+          </a:p>
+        </p:txBody>
+      </p:sp>
+      <p:sp>
+        <p:nvSpPr>
+          <p:cNvPr id="12" name="TextBox 11"/>
+          <p:cNvSpPr txBox="1"/>
+          <p:nvPr/>
+        </p:nvSpPr>
+        <p:spPr>
+          <a:xfrm>
+            <a:off x="190500" y="1675812"/>
+            <a:ext cx="3237234" cy="3231654"/>
+          </a:xfrm>
+          <a:prstGeom prst="rect">
+            <a:avLst/>
+          </a:prstGeom>
+          <a:noFill/>
+        </p:spPr>
+        <p:txBody>
+          <a:bodyPr wrap="square" rtlCol="0">
+            <a:spAutoFit/>
+          </a:bodyPr>
+          <a:lstStyle/>
+          <a:p>
+            <a:pPr marL="285750" indent="-285750">
+              <a:lnSpc>
+                <a:spcPct val="150000"/>
+              </a:lnSpc>
+              <a:buFont typeface="Arial" panose="020B0604020202020204" pitchFamily="34" charset="0"/>
               <a:buChar char="•"/>
             </a:pPr>
             <a:r>
-              <a:rPr lang="en-US" sz="2000" dirty="0">
-                <a:latin typeface="Trebuchet MS" pitchFamily="34" charset="0"/>
-              </a:rPr>
-              <a:t>Enough logs</a:t>
-            </a:r>
-          </a:p>
-          <a:p>
-            <a:pPr marL="457200" lvl="0" indent="-457200" defTabSz="914400">
-              <a:spcBef>
-                <a:spcPct val="20000"/>
-              </a:spcBef>
-              <a:buClr>
-                <a:schemeClr val="accent3">
-                  <a:lumMod val="75000"/>
-                </a:schemeClr>
-              </a:buClr>
-              <a:buFont typeface="Arial" pitchFamily="34" charset="0"/>
+              <a:rPr lang="en-US" sz="2400" dirty="0" smtClean="0"/>
+              <a:t>App Server</a:t>
+            </a:r>
+          </a:p>
+          <a:p>
+            <a:pPr marL="971550" lvl="2" indent="-285750">
+              <a:lnSpc>
+                <a:spcPct val="150000"/>
+              </a:lnSpc>
+              <a:buFont typeface="Arial" panose="020B0604020202020204" pitchFamily="34" charset="0"/>
               <a:buChar char="•"/>
             </a:pPr>
             <a:r>
-              <a:rPr lang="en-US" sz="2000" dirty="0">
-                <a:latin typeface="Trebuchet MS" pitchFamily="34" charset="0"/>
-              </a:rPr>
-              <a:t>For interaction failures: full </a:t>
-            </a:r>
-            <a:r>
-              <a:rPr lang="en-US" sz="2000" dirty="0" err="1">
-                <a:latin typeface="Trebuchet MS" pitchFamily="34" charset="0"/>
-              </a:rPr>
-              <a:t>req-resp</a:t>
-            </a:r>
-            <a:endParaRPr lang="en-US" sz="2000" dirty="0">
-              <a:latin typeface="Trebuchet MS" pitchFamily="34" charset="0"/>
-            </a:endParaRPr>
-          </a:p>
-          <a:p>
-            <a:pPr marL="457200" lvl="0" indent="-457200" defTabSz="914400">
-              <a:spcBef>
-                <a:spcPct val="20000"/>
-              </a:spcBef>
-              <a:buClr>
-                <a:schemeClr val="accent3">
-                  <a:lumMod val="75000"/>
-                </a:schemeClr>
-              </a:buClr>
-              <a:buFont typeface="Arial" pitchFamily="34" charset="0"/>
+              <a:rPr lang="en-US" sz="2000" dirty="0" smtClean="0"/>
+              <a:t>Amazon ELB</a:t>
+            </a:r>
+          </a:p>
+          <a:p>
+            <a:pPr marL="285750" indent="-285750">
+              <a:lnSpc>
+                <a:spcPct val="150000"/>
+              </a:lnSpc>
+              <a:buFont typeface="Arial" panose="020B0604020202020204" pitchFamily="34" charset="0"/>
               <a:buChar char="•"/>
             </a:pPr>
             <a:r>
-              <a:rPr lang="en-US" sz="2000" dirty="0">
-                <a:latin typeface="Trebuchet MS" pitchFamily="34" charset="0"/>
-              </a:rPr>
-              <a:t>What to log (essential context, app id, user)</a:t>
-            </a:r>
-          </a:p>
-          <a:p>
-            <a:pPr marL="457200" lvl="0" indent="-457200" defTabSz="914400">
-              <a:spcBef>
-                <a:spcPct val="20000"/>
-              </a:spcBef>
-              <a:buClr>
-                <a:schemeClr val="accent3">
-                  <a:lumMod val="75000"/>
-                </a:schemeClr>
-              </a:buClr>
-              <a:buFont typeface="Arial" pitchFamily="34" charset="0"/>
+              <a:rPr lang="en-US" sz="2400" dirty="0" smtClean="0"/>
+              <a:t>Schedule (Quartz)</a:t>
+            </a:r>
+          </a:p>
+          <a:p>
+            <a:pPr marL="971550" lvl="2" indent="-285750">
+              <a:lnSpc>
+                <a:spcPct val="150000"/>
+              </a:lnSpc>
+              <a:buFont typeface="Arial" panose="020B0604020202020204" pitchFamily="34" charset="0"/>
               <a:buChar char="•"/>
             </a:pPr>
             <a:r>
-              <a:rPr lang="en-US" sz="2000" dirty="0">
-                <a:latin typeface="Trebuchet MS" pitchFamily="34" charset="0"/>
-              </a:rPr>
-              <a:t>Same format for all (</a:t>
-            </a:r>
-            <a:r>
-              <a:rPr lang="en-US" sz="2000" dirty="0" err="1">
-                <a:latin typeface="Trebuchet MS" pitchFamily="34" charset="0"/>
-              </a:rPr>
-              <a:t>logback</a:t>
-            </a:r>
-            <a:r>
-              <a:rPr lang="en-US" sz="2000" dirty="0">
-                <a:latin typeface="Trebuchet MS" pitchFamily="34" charset="0"/>
-              </a:rPr>
-              <a:t> include)</a:t>
-            </a:r>
-          </a:p>
-          <a:p>
-            <a:pPr marL="457200" lvl="0" indent="-457200" defTabSz="914400">
-              <a:spcBef>
-                <a:spcPct val="20000"/>
-              </a:spcBef>
-              <a:buClr>
-                <a:schemeClr val="accent3">
-                  <a:lumMod val="75000"/>
-                </a:schemeClr>
-              </a:buClr>
-              <a:buFont typeface="Arial" pitchFamily="34" charset="0"/>
+              <a:rPr lang="en-US" sz="2000" dirty="0" smtClean="0"/>
+              <a:t>clustering in DB</a:t>
+            </a:r>
+          </a:p>
+          <a:p>
+            <a:pPr marL="285750" indent="-285750">
+              <a:lnSpc>
+                <a:spcPct val="150000"/>
+              </a:lnSpc>
+              <a:buFont typeface="Arial" panose="020B0604020202020204" pitchFamily="34" charset="0"/>
               <a:buChar char="•"/>
             </a:pPr>
             <a:r>
-              <a:rPr lang="en-US" sz="2000" dirty="0">
-                <a:latin typeface="Trebuchet MS" pitchFamily="34" charset="0"/>
-              </a:rPr>
-              <a:t>Correlation ID</a:t>
-            </a:r>
-          </a:p>
-          <a:p>
-            <a:pPr marL="457200" lvl="0" indent="-457200" defTabSz="914400">
-              <a:spcBef>
-                <a:spcPct val="20000"/>
-              </a:spcBef>
-              <a:buClr>
-                <a:schemeClr val="accent3">
-                  <a:lumMod val="75000"/>
-                </a:schemeClr>
-              </a:buClr>
-              <a:buFont typeface="Arial" pitchFamily="34" charset="0"/>
+              <a:rPr lang="en-US" sz="2400" dirty="0" smtClean="0"/>
+              <a:t>Routes (Camel)</a:t>
+            </a:r>
+          </a:p>
+          <a:p>
+            <a:pPr marL="971550" lvl="2" indent="-285750">
+              <a:lnSpc>
+                <a:spcPct val="150000"/>
+              </a:lnSpc>
+              <a:buFont typeface="Arial" panose="020B0604020202020204" pitchFamily="34" charset="0"/>
               <a:buChar char="•"/>
             </a:pPr>
             <a:r>
-              <a:rPr lang="en-US" sz="2000" dirty="0">
-                <a:latin typeface="Trebuchet MS" pitchFamily="34" charset="0"/>
-              </a:rPr>
-              <a:t>Centralized logging</a:t>
-            </a:r>
-            <a:endParaRPr lang="ru-RU" sz="1600" dirty="0">
-              <a:latin typeface="Trebuchet MS" pitchFamily="34" charset="0"/>
-            </a:endParaRPr>
+              <a:rPr lang="en-US" sz="2000" dirty="0" smtClean="0"/>
+              <a:t>zookeeper policy</a:t>
+            </a:r>
+            <a:endParaRPr lang="ru-RU" sz="2000" dirty="0"/>
           </a:p>
         </p:txBody>
       </p:sp>
     </p:spTree>
     <p:extLst>
       <p:ext uri="{BB962C8B-B14F-4D97-AF65-F5344CB8AC3E}">
-        <p14:creationId xmlns:p14="http://schemas.microsoft.com/office/powerpoint/2010/main" val="312215911"/>
+        <p14:creationId xmlns:p14="http://schemas.microsoft.com/office/powerpoint/2010/main" val="2067062242"/>
       </p:ext>
     </p:extLst>
   </p:cSld>
@@ -29795,6 +30236,2641 @@
       </p:grpSpPr>
       <p:pic>
         <p:nvPicPr>
+          <p:cNvPr id="1062" name="Picture 38" descr="Картинки по запросу liquibase"/>
+          <p:cNvPicPr>
+            <a:picLocks noChangeAspect="1" noChangeArrowheads="1"/>
+          </p:cNvPicPr>
+          <p:nvPr/>
+        </p:nvPicPr>
+        <p:blipFill>
+          <a:blip r:embed="rId3">
+            <a:extLst>
+              <a:ext uri="{28A0092B-C50C-407E-A947-70E740481C1C}">
+                <a14:useLocalDpi xmlns:a14="http://schemas.microsoft.com/office/drawing/2010/main" val="0"/>
+              </a:ext>
+            </a:extLst>
+          </a:blip>
+          <a:srcRect/>
+          <a:stretch>
+            <a:fillRect/>
+          </a:stretch>
+        </p:blipFill>
+        <p:spPr bwMode="auto">
+          <a:xfrm>
+            <a:off x="5105788" y="2475913"/>
+            <a:ext cx="1476604" cy="977752"/>
+          </a:xfrm>
+          <a:prstGeom prst="rect">
+            <a:avLst/>
+          </a:prstGeom>
+          <a:noFill/>
+          <a:extLst>
+            <a:ext uri="{909E8E84-426E-40DD-AFC4-6F175D3DCCD1}">
+              <a14:hiddenFill xmlns:a14="http://schemas.microsoft.com/office/drawing/2010/main">
+                <a:solidFill>
+                  <a:srgbClr val="FFFFFF"/>
+                </a:solidFill>
+              </a14:hiddenFill>
+            </a:ext>
+          </a:extLst>
+        </p:spPr>
+      </p:pic>
+      <p:pic>
+        <p:nvPicPr>
+          <p:cNvPr id="1038" name="Picture 14" descr="Картинки по запросу spring framework logo"/>
+          <p:cNvPicPr>
+            <a:picLocks noChangeAspect="1" noChangeArrowheads="1"/>
+          </p:cNvPicPr>
+          <p:nvPr/>
+        </p:nvPicPr>
+        <p:blipFill>
+          <a:blip r:embed="rId4">
+            <a:extLst>
+              <a:ext uri="{28A0092B-C50C-407E-A947-70E740481C1C}">
+                <a14:useLocalDpi xmlns:a14="http://schemas.microsoft.com/office/drawing/2010/main" val="0"/>
+              </a:ext>
+            </a:extLst>
+          </a:blip>
+          <a:srcRect/>
+          <a:stretch>
+            <a:fillRect/>
+          </a:stretch>
+        </p:blipFill>
+        <p:spPr bwMode="auto">
+          <a:xfrm>
+            <a:off x="155575" y="2087769"/>
+            <a:ext cx="1481213" cy="776288"/>
+          </a:xfrm>
+          <a:prstGeom prst="rect">
+            <a:avLst/>
+          </a:prstGeom>
+          <a:noFill/>
+          <a:extLst>
+            <a:ext uri="{909E8E84-426E-40DD-AFC4-6F175D3DCCD1}">
+              <a14:hiddenFill xmlns:a14="http://schemas.microsoft.com/office/drawing/2010/main">
+                <a:solidFill>
+                  <a:srgbClr val="FFFFFF"/>
+                </a:solidFill>
+              </a14:hiddenFill>
+            </a:ext>
+          </a:extLst>
+        </p:spPr>
+      </p:pic>
+      <p:sp>
+        <p:nvSpPr>
+          <p:cNvPr id="3" name="Text Placeholder 2"/>
+          <p:cNvSpPr>
+            <a:spLocks noGrp="1"/>
+          </p:cNvSpPr>
+          <p:nvPr>
+            <p:ph type="body" sz="quarter" idx="11"/>
+          </p:nvPr>
+        </p:nvSpPr>
+        <p:spPr/>
+        <p:txBody>
+          <a:bodyPr/>
+          <a:lstStyle/>
+          <a:p>
+            <a:r>
+              <a:rPr lang="en-US" dirty="0" smtClean="0"/>
+              <a:t>What we use?</a:t>
+            </a:r>
+            <a:endParaRPr lang="en-US" dirty="0"/>
+          </a:p>
+        </p:txBody>
+      </p:sp>
+      <p:sp>
+        <p:nvSpPr>
+          <p:cNvPr id="2" name="AutoShape 2" descr="Картинки по запросу activemq"/>
+          <p:cNvSpPr>
+            <a:spLocks noChangeAspect="1" noChangeArrowheads="1"/>
+          </p:cNvSpPr>
+          <p:nvPr/>
+        </p:nvSpPr>
+        <p:spPr bwMode="auto">
+          <a:xfrm>
+            <a:off x="155575" y="-144463"/>
+            <a:ext cx="304800" cy="304801"/>
+          </a:xfrm>
+          <a:prstGeom prst="rect">
+            <a:avLst/>
+          </a:prstGeom>
+          <a:noFill/>
+          <a:extLst>
+            <a:ext uri="{909E8E84-426E-40DD-AFC4-6F175D3DCCD1}">
+              <a14:hiddenFill xmlns:a14="http://schemas.microsoft.com/office/drawing/2010/main">
+                <a:solidFill>
+                  <a:srgbClr val="FFFFFF"/>
+                </a:solidFill>
+              </a14:hiddenFill>
+            </a:ext>
+          </a:extLst>
+        </p:spPr>
+        <p:txBody>
+          <a:bodyPr vert="horz" wrap="square" lIns="91440" tIns="45720" rIns="91440" bIns="45720" numCol="1" anchor="t" anchorCtr="0" compatLnSpc="1">
+            <a:prstTxWarp prst="textNoShape">
+              <a:avLst/>
+            </a:prstTxWarp>
+          </a:bodyPr>
+          <a:lstStyle/>
+          <a:p>
+            <a:endParaRPr lang="ru-RU"/>
+          </a:p>
+        </p:txBody>
+      </p:sp>
+      <p:pic>
+        <p:nvPicPr>
+          <p:cNvPr id="1028" name="Picture 4" descr="Похожее изображение"/>
+          <p:cNvPicPr>
+            <a:picLocks noChangeAspect="1" noChangeArrowheads="1"/>
+          </p:cNvPicPr>
+          <p:nvPr/>
+        </p:nvPicPr>
+        <p:blipFill>
+          <a:blip r:embed="rId5">
+            <a:extLst>
+              <a:ext uri="{28A0092B-C50C-407E-A947-70E740481C1C}">
+                <a14:useLocalDpi xmlns:a14="http://schemas.microsoft.com/office/drawing/2010/main" val="0"/>
+              </a:ext>
+            </a:extLst>
+          </a:blip>
+          <a:srcRect/>
+          <a:stretch>
+            <a:fillRect/>
+          </a:stretch>
+        </p:blipFill>
+        <p:spPr bwMode="auto">
+          <a:xfrm>
+            <a:off x="2420377" y="1068118"/>
+            <a:ext cx="1749425" cy="890812"/>
+          </a:xfrm>
+          <a:prstGeom prst="rect">
+            <a:avLst/>
+          </a:prstGeom>
+          <a:noFill/>
+          <a:extLst>
+            <a:ext uri="{909E8E84-426E-40DD-AFC4-6F175D3DCCD1}">
+              <a14:hiddenFill xmlns:a14="http://schemas.microsoft.com/office/drawing/2010/main">
+                <a:solidFill>
+                  <a:srgbClr val="FFFFFF"/>
+                </a:solidFill>
+              </a14:hiddenFill>
+            </a:ext>
+          </a:extLst>
+        </p:spPr>
+      </p:pic>
+      <p:sp>
+        <p:nvSpPr>
+          <p:cNvPr id="5" name="TextBox 4"/>
+          <p:cNvSpPr txBox="1"/>
+          <p:nvPr/>
+        </p:nvSpPr>
+        <p:spPr>
+          <a:xfrm>
+            <a:off x="728679" y="864958"/>
+            <a:ext cx="688009" cy="369332"/>
+          </a:xfrm>
+          <a:prstGeom prst="rect">
+            <a:avLst/>
+          </a:prstGeom>
+          <a:noFill/>
+        </p:spPr>
+        <p:txBody>
+          <a:bodyPr wrap="none" rtlCol="0">
+            <a:spAutoFit/>
+          </a:bodyPr>
+          <a:lstStyle/>
+          <a:p>
+            <a:r>
+              <a:rPr lang="en-US" sz="1800" b="1" dirty="0" smtClean="0"/>
+              <a:t>Core</a:t>
+            </a:r>
+            <a:endParaRPr lang="ru-RU" sz="1800" b="1" dirty="0"/>
+          </a:p>
+        </p:txBody>
+      </p:sp>
+      <p:sp>
+        <p:nvSpPr>
+          <p:cNvPr id="6" name="TextBox 5"/>
+          <p:cNvSpPr txBox="1"/>
+          <p:nvPr/>
+        </p:nvSpPr>
+        <p:spPr>
+          <a:xfrm>
+            <a:off x="2782551" y="850982"/>
+            <a:ext cx="1366849" cy="369332"/>
+          </a:xfrm>
+          <a:prstGeom prst="rect">
+            <a:avLst/>
+          </a:prstGeom>
+          <a:noFill/>
+        </p:spPr>
+        <p:txBody>
+          <a:bodyPr wrap="none" rtlCol="0">
+            <a:spAutoFit/>
+          </a:bodyPr>
+          <a:lstStyle/>
+          <a:p>
+            <a:r>
+              <a:rPr lang="en-US" sz="1800" b="1" dirty="0" smtClean="0"/>
+              <a:t>Integration</a:t>
+            </a:r>
+            <a:endParaRPr lang="ru-RU" sz="1800" b="1" dirty="0"/>
+          </a:p>
+        </p:txBody>
+      </p:sp>
+      <p:sp>
+        <p:nvSpPr>
+          <p:cNvPr id="7" name="TextBox 6"/>
+          <p:cNvSpPr txBox="1"/>
+          <p:nvPr/>
+        </p:nvSpPr>
+        <p:spPr>
+          <a:xfrm>
+            <a:off x="5338125" y="870052"/>
+            <a:ext cx="984565" cy="369332"/>
+          </a:xfrm>
+          <a:prstGeom prst="rect">
+            <a:avLst/>
+          </a:prstGeom>
+          <a:noFill/>
+        </p:spPr>
+        <p:txBody>
+          <a:bodyPr wrap="none" rtlCol="0">
+            <a:spAutoFit/>
+          </a:bodyPr>
+          <a:lstStyle/>
+          <a:p>
+            <a:r>
+              <a:rPr lang="en-US" sz="1800" b="1" dirty="0" err="1" smtClean="0"/>
+              <a:t>DevOps</a:t>
+            </a:r>
+            <a:endParaRPr lang="ru-RU" sz="1800" b="1" dirty="0"/>
+          </a:p>
+        </p:txBody>
+      </p:sp>
+      <p:sp>
+        <p:nvSpPr>
+          <p:cNvPr id="8" name="AutoShape 6" descr="Картинки по запросу java 8"/>
+          <p:cNvSpPr>
+            <a:spLocks noChangeAspect="1" noChangeArrowheads="1"/>
+          </p:cNvSpPr>
+          <p:nvPr/>
+        </p:nvSpPr>
+        <p:spPr bwMode="auto">
+          <a:xfrm>
+            <a:off x="307975" y="7937"/>
+            <a:ext cx="304800" cy="304801"/>
+          </a:xfrm>
+          <a:prstGeom prst="rect">
+            <a:avLst/>
+          </a:prstGeom>
+          <a:noFill/>
+          <a:extLst>
+            <a:ext uri="{909E8E84-426E-40DD-AFC4-6F175D3DCCD1}">
+              <a14:hiddenFill xmlns:a14="http://schemas.microsoft.com/office/drawing/2010/main">
+                <a:solidFill>
+                  <a:srgbClr val="FFFFFF"/>
+                </a:solidFill>
+              </a14:hiddenFill>
+            </a:ext>
+          </a:extLst>
+        </p:spPr>
+        <p:txBody>
+          <a:bodyPr vert="horz" wrap="square" lIns="91440" tIns="45720" rIns="91440" bIns="45720" numCol="1" anchor="t" anchorCtr="0" compatLnSpc="1">
+            <a:prstTxWarp prst="textNoShape">
+              <a:avLst/>
+            </a:prstTxWarp>
+          </a:bodyPr>
+          <a:lstStyle/>
+          <a:p>
+            <a:endParaRPr lang="ru-RU"/>
+          </a:p>
+        </p:txBody>
+      </p:sp>
+      <p:sp>
+        <p:nvSpPr>
+          <p:cNvPr id="10" name="AutoShape 8" descr="Картинки по запросу java 8"/>
+          <p:cNvSpPr>
+            <a:spLocks noChangeAspect="1" noChangeArrowheads="1"/>
+          </p:cNvSpPr>
+          <p:nvPr/>
+        </p:nvSpPr>
+        <p:spPr bwMode="auto">
+          <a:xfrm>
+            <a:off x="1321738" y="3237568"/>
+            <a:ext cx="304800" cy="304801"/>
+          </a:xfrm>
+          <a:prstGeom prst="rect">
+            <a:avLst/>
+          </a:prstGeom>
+          <a:noFill/>
+          <a:extLst>
+            <a:ext uri="{909E8E84-426E-40DD-AFC4-6F175D3DCCD1}">
+              <a14:hiddenFill xmlns:a14="http://schemas.microsoft.com/office/drawing/2010/main">
+                <a:solidFill>
+                  <a:srgbClr val="FFFFFF"/>
+                </a:solidFill>
+              </a14:hiddenFill>
+            </a:ext>
+          </a:extLst>
+        </p:spPr>
+        <p:txBody>
+          <a:bodyPr vert="horz" wrap="square" lIns="91440" tIns="45720" rIns="91440" bIns="45720" numCol="1" anchor="t" anchorCtr="0" compatLnSpc="1">
+            <a:prstTxWarp prst="textNoShape">
+              <a:avLst/>
+            </a:prstTxWarp>
+          </a:bodyPr>
+          <a:lstStyle/>
+          <a:p>
+            <a:endParaRPr lang="ru-RU"/>
+          </a:p>
+        </p:txBody>
+      </p:sp>
+      <p:pic>
+        <p:nvPicPr>
+          <p:cNvPr id="1034" name="Picture 10" descr="Картинки по запросу java 8"/>
+          <p:cNvPicPr>
+            <a:picLocks noChangeAspect="1" noChangeArrowheads="1"/>
+          </p:cNvPicPr>
+          <p:nvPr/>
+        </p:nvPicPr>
+        <p:blipFill>
+          <a:blip r:embed="rId6">
+            <a:extLst>
+              <a:ext uri="{28A0092B-C50C-407E-A947-70E740481C1C}">
+                <a14:useLocalDpi xmlns:a14="http://schemas.microsoft.com/office/drawing/2010/main" val="0"/>
+              </a:ext>
+            </a:extLst>
+          </a:blip>
+          <a:srcRect/>
+          <a:stretch>
+            <a:fillRect/>
+          </a:stretch>
+        </p:blipFill>
+        <p:spPr bwMode="auto">
+          <a:xfrm>
+            <a:off x="571803" y="1320350"/>
+            <a:ext cx="926568" cy="989112"/>
+          </a:xfrm>
+          <a:prstGeom prst="rect">
+            <a:avLst/>
+          </a:prstGeom>
+          <a:noFill/>
+          <a:extLst>
+            <a:ext uri="{909E8E84-426E-40DD-AFC4-6F175D3DCCD1}">
+              <a14:hiddenFill xmlns:a14="http://schemas.microsoft.com/office/drawing/2010/main">
+                <a:solidFill>
+                  <a:srgbClr val="FFFFFF"/>
+                </a:solidFill>
+              </a14:hiddenFill>
+            </a:ext>
+          </a:extLst>
+        </p:spPr>
+      </p:pic>
+      <p:pic>
+        <p:nvPicPr>
+          <p:cNvPr id="1036" name="Picture 12" descr="Картинки по запросу tomcat 8"/>
+          <p:cNvPicPr>
+            <a:picLocks noChangeAspect="1" noChangeArrowheads="1"/>
+          </p:cNvPicPr>
+          <p:nvPr/>
+        </p:nvPicPr>
+        <p:blipFill>
+          <a:blip r:embed="rId7">
+            <a:extLst>
+              <a:ext uri="{28A0092B-C50C-407E-A947-70E740481C1C}">
+                <a14:useLocalDpi xmlns:a14="http://schemas.microsoft.com/office/drawing/2010/main" val="0"/>
+              </a:ext>
+            </a:extLst>
+          </a:blip>
+          <a:srcRect/>
+          <a:stretch>
+            <a:fillRect/>
+          </a:stretch>
+        </p:blipFill>
+        <p:spPr bwMode="auto">
+          <a:xfrm>
+            <a:off x="449858" y="3792507"/>
+            <a:ext cx="892645" cy="636615"/>
+          </a:xfrm>
+          <a:prstGeom prst="rect">
+            <a:avLst/>
+          </a:prstGeom>
+          <a:noFill/>
+          <a:extLst>
+            <a:ext uri="{909E8E84-426E-40DD-AFC4-6F175D3DCCD1}">
+              <a14:hiddenFill xmlns:a14="http://schemas.microsoft.com/office/drawing/2010/main">
+                <a:solidFill>
+                  <a:srgbClr val="FFFFFF"/>
+                </a:solidFill>
+              </a14:hiddenFill>
+            </a:ext>
+          </a:extLst>
+        </p:spPr>
+      </p:pic>
+      <p:pic>
+        <p:nvPicPr>
+          <p:cNvPr id="1040" name="Picture 16" descr="Картинки по запросу gradle"/>
+          <p:cNvPicPr>
+            <a:picLocks noChangeAspect="1" noChangeArrowheads="1"/>
+          </p:cNvPicPr>
+          <p:nvPr/>
+        </p:nvPicPr>
+        <p:blipFill>
+          <a:blip r:embed="rId8">
+            <a:extLst>
+              <a:ext uri="{28A0092B-C50C-407E-A947-70E740481C1C}">
+                <a14:useLocalDpi xmlns:a14="http://schemas.microsoft.com/office/drawing/2010/main" val="0"/>
+              </a:ext>
+            </a:extLst>
+          </a:blip>
+          <a:srcRect/>
+          <a:stretch>
+            <a:fillRect/>
+          </a:stretch>
+        </p:blipFill>
+        <p:spPr bwMode="auto">
+          <a:xfrm>
+            <a:off x="197972" y="3349121"/>
+            <a:ext cx="1586354" cy="443386"/>
+          </a:xfrm>
+          <a:prstGeom prst="rect">
+            <a:avLst/>
+          </a:prstGeom>
+          <a:noFill/>
+          <a:extLst>
+            <a:ext uri="{909E8E84-426E-40DD-AFC4-6F175D3DCCD1}">
+              <a14:hiddenFill xmlns:a14="http://schemas.microsoft.com/office/drawing/2010/main">
+                <a:solidFill>
+                  <a:srgbClr val="FFFFFF"/>
+                </a:solidFill>
+              </a14:hiddenFill>
+            </a:ext>
+          </a:extLst>
+        </p:spPr>
+      </p:pic>
+      <p:pic>
+        <p:nvPicPr>
+          <p:cNvPr id="1042" name="Picture 18" descr="Картинки по запросу spring mvc logo"/>
+          <p:cNvPicPr>
+            <a:picLocks noChangeAspect="1" noChangeArrowheads="1"/>
+          </p:cNvPicPr>
+          <p:nvPr/>
+        </p:nvPicPr>
+        <p:blipFill>
+          <a:blip r:embed="rId9">
+            <a:extLst>
+              <a:ext uri="{28A0092B-C50C-407E-A947-70E740481C1C}">
+                <a14:useLocalDpi xmlns:a14="http://schemas.microsoft.com/office/drawing/2010/main" val="0"/>
+              </a:ext>
+            </a:extLst>
+          </a:blip>
+          <a:srcRect/>
+          <a:stretch>
+            <a:fillRect/>
+          </a:stretch>
+        </p:blipFill>
+        <p:spPr bwMode="auto">
+          <a:xfrm>
+            <a:off x="197972" y="2794526"/>
+            <a:ext cx="1749425" cy="494457"/>
+          </a:xfrm>
+          <a:prstGeom prst="rect">
+            <a:avLst/>
+          </a:prstGeom>
+          <a:noFill/>
+          <a:extLst>
+            <a:ext uri="{909E8E84-426E-40DD-AFC4-6F175D3DCCD1}">
+              <a14:hiddenFill xmlns:a14="http://schemas.microsoft.com/office/drawing/2010/main">
+                <a:solidFill>
+                  <a:srgbClr val="FFFFFF"/>
+                </a:solidFill>
+              </a14:hiddenFill>
+            </a:ext>
+          </a:extLst>
+        </p:spPr>
+      </p:pic>
+      <p:pic>
+        <p:nvPicPr>
+          <p:cNvPr id="1044" name="Picture 20" descr="Картинки по запросу apache camel"/>
+          <p:cNvPicPr>
+            <a:picLocks noChangeAspect="1" noChangeArrowheads="1"/>
+          </p:cNvPicPr>
+          <p:nvPr/>
+        </p:nvPicPr>
+        <p:blipFill>
+          <a:blip r:embed="rId10">
+            <a:extLst>
+              <a:ext uri="{28A0092B-C50C-407E-A947-70E740481C1C}">
+                <a14:useLocalDpi xmlns:a14="http://schemas.microsoft.com/office/drawing/2010/main" val="0"/>
+              </a:ext>
+            </a:extLst>
+          </a:blip>
+          <a:srcRect/>
+          <a:stretch>
+            <a:fillRect/>
+          </a:stretch>
+        </p:blipFill>
+        <p:spPr bwMode="auto">
+          <a:xfrm>
+            <a:off x="2677273" y="1781349"/>
+            <a:ext cx="1479038" cy="724687"/>
+          </a:xfrm>
+          <a:prstGeom prst="rect">
+            <a:avLst/>
+          </a:prstGeom>
+          <a:noFill/>
+          <a:extLst>
+            <a:ext uri="{909E8E84-426E-40DD-AFC4-6F175D3DCCD1}">
+              <a14:hiddenFill xmlns:a14="http://schemas.microsoft.com/office/drawing/2010/main">
+                <a:solidFill>
+                  <a:srgbClr val="FFFFFF"/>
+                </a:solidFill>
+              </a14:hiddenFill>
+            </a:ext>
+          </a:extLst>
+        </p:spPr>
+      </p:pic>
+      <p:pic>
+        <p:nvPicPr>
+          <p:cNvPr id="1046" name="Picture 22" descr="Картинки по запросу elasticsearch"/>
+          <p:cNvPicPr>
+            <a:picLocks noChangeAspect="1" noChangeArrowheads="1"/>
+          </p:cNvPicPr>
+          <p:nvPr/>
+        </p:nvPicPr>
+        <p:blipFill>
+          <a:blip r:embed="rId11">
+            <a:extLst>
+              <a:ext uri="{28A0092B-C50C-407E-A947-70E740481C1C}">
+                <a14:useLocalDpi xmlns:a14="http://schemas.microsoft.com/office/drawing/2010/main" val="0"/>
+              </a:ext>
+            </a:extLst>
+          </a:blip>
+          <a:srcRect/>
+          <a:stretch>
+            <a:fillRect/>
+          </a:stretch>
+        </p:blipFill>
+        <p:spPr bwMode="auto">
+          <a:xfrm>
+            <a:off x="2638966" y="3160264"/>
+            <a:ext cx="1728104" cy="459408"/>
+          </a:xfrm>
+          <a:prstGeom prst="rect">
+            <a:avLst/>
+          </a:prstGeom>
+          <a:noFill/>
+          <a:extLst>
+            <a:ext uri="{909E8E84-426E-40DD-AFC4-6F175D3DCCD1}">
+              <a14:hiddenFill xmlns:a14="http://schemas.microsoft.com/office/drawing/2010/main">
+                <a:solidFill>
+                  <a:srgbClr val="FFFFFF"/>
+                </a:solidFill>
+              </a14:hiddenFill>
+            </a:ext>
+          </a:extLst>
+        </p:spPr>
+      </p:pic>
+      <p:pic>
+        <p:nvPicPr>
+          <p:cNvPr id="1052" name="Picture 28" descr="Картинки по запросу mongodb"/>
+          <p:cNvPicPr>
+            <a:picLocks noChangeAspect="1" noChangeArrowheads="1"/>
+          </p:cNvPicPr>
+          <p:nvPr/>
+        </p:nvPicPr>
+        <p:blipFill>
+          <a:blip r:embed="rId12">
+            <a:extLst>
+              <a:ext uri="{28A0092B-C50C-407E-A947-70E740481C1C}">
+                <a14:useLocalDpi xmlns:a14="http://schemas.microsoft.com/office/drawing/2010/main" val="0"/>
+              </a:ext>
+            </a:extLst>
+          </a:blip>
+          <a:srcRect/>
+          <a:stretch>
+            <a:fillRect/>
+          </a:stretch>
+        </p:blipFill>
+        <p:spPr bwMode="auto">
+          <a:xfrm>
+            <a:off x="2712895" y="3695634"/>
+            <a:ext cx="1654175" cy="449340"/>
+          </a:xfrm>
+          <a:prstGeom prst="rect">
+            <a:avLst/>
+          </a:prstGeom>
+          <a:noFill/>
+          <a:extLst>
+            <a:ext uri="{909E8E84-426E-40DD-AFC4-6F175D3DCCD1}">
+              <a14:hiddenFill xmlns:a14="http://schemas.microsoft.com/office/drawing/2010/main">
+                <a:solidFill>
+                  <a:srgbClr val="FFFFFF"/>
+                </a:solidFill>
+              </a14:hiddenFill>
+            </a:ext>
+          </a:extLst>
+        </p:spPr>
+      </p:pic>
+      <p:pic>
+        <p:nvPicPr>
+          <p:cNvPr id="1054" name="Picture 30" descr="Картинки по запросу postgresql"/>
+          <p:cNvPicPr>
+            <a:picLocks noChangeAspect="1" noChangeArrowheads="1"/>
+          </p:cNvPicPr>
+          <p:nvPr/>
+        </p:nvPicPr>
+        <p:blipFill>
+          <a:blip r:embed="rId13">
+            <a:extLst>
+              <a:ext uri="{28A0092B-C50C-407E-A947-70E740481C1C}">
+                <a14:useLocalDpi xmlns:a14="http://schemas.microsoft.com/office/drawing/2010/main" val="0"/>
+              </a:ext>
+            </a:extLst>
+          </a:blip>
+          <a:srcRect/>
+          <a:stretch>
+            <a:fillRect/>
+          </a:stretch>
+        </p:blipFill>
+        <p:spPr bwMode="auto">
+          <a:xfrm>
+            <a:off x="2712895" y="4220936"/>
+            <a:ext cx="1535762" cy="704940"/>
+          </a:xfrm>
+          <a:prstGeom prst="rect">
+            <a:avLst/>
+          </a:prstGeom>
+          <a:noFill/>
+          <a:extLst>
+            <a:ext uri="{909E8E84-426E-40DD-AFC4-6F175D3DCCD1}">
+              <a14:hiddenFill xmlns:a14="http://schemas.microsoft.com/office/drawing/2010/main">
+                <a:solidFill>
+                  <a:srgbClr val="FFFFFF"/>
+                </a:solidFill>
+              </a14:hiddenFill>
+            </a:ext>
+          </a:extLst>
+        </p:spPr>
+      </p:pic>
+      <p:pic>
+        <p:nvPicPr>
+          <p:cNvPr id="1056" name="Picture 32" descr="Картинки по запросу amazon S3"/>
+          <p:cNvPicPr>
+            <a:picLocks noChangeAspect="1" noChangeArrowheads="1"/>
+          </p:cNvPicPr>
+          <p:nvPr/>
+        </p:nvPicPr>
+        <p:blipFill>
+          <a:blip r:embed="rId14">
+            <a:extLst>
+              <a:ext uri="{28A0092B-C50C-407E-A947-70E740481C1C}">
+                <a14:useLocalDpi xmlns:a14="http://schemas.microsoft.com/office/drawing/2010/main" val="0"/>
+              </a:ext>
+            </a:extLst>
+          </a:blip>
+          <a:srcRect/>
+          <a:stretch>
+            <a:fillRect/>
+          </a:stretch>
+        </p:blipFill>
+        <p:spPr bwMode="auto">
+          <a:xfrm>
+            <a:off x="3047055" y="2525818"/>
+            <a:ext cx="911925" cy="717381"/>
+          </a:xfrm>
+          <a:prstGeom prst="rect">
+            <a:avLst/>
+          </a:prstGeom>
+          <a:noFill/>
+          <a:extLst>
+            <a:ext uri="{909E8E84-426E-40DD-AFC4-6F175D3DCCD1}">
+              <a14:hiddenFill xmlns:a14="http://schemas.microsoft.com/office/drawing/2010/main">
+                <a:solidFill>
+                  <a:srgbClr val="FFFFFF"/>
+                </a:solidFill>
+              </a14:hiddenFill>
+            </a:ext>
+          </a:extLst>
+        </p:spPr>
+      </p:pic>
+      <p:pic>
+        <p:nvPicPr>
+          <p:cNvPr id="1058" name="Picture 34" descr="Картинки по запросу chef logo deploy"/>
+          <p:cNvPicPr>
+            <a:picLocks noChangeAspect="1" noChangeArrowheads="1"/>
+          </p:cNvPicPr>
+          <p:nvPr/>
+        </p:nvPicPr>
+        <p:blipFill>
+          <a:blip r:embed="rId15">
+            <a:extLst>
+              <a:ext uri="{28A0092B-C50C-407E-A947-70E740481C1C}">
+                <a14:useLocalDpi xmlns:a14="http://schemas.microsoft.com/office/drawing/2010/main" val="0"/>
+              </a:ext>
+            </a:extLst>
+          </a:blip>
+          <a:srcRect/>
+          <a:stretch>
+            <a:fillRect/>
+          </a:stretch>
+        </p:blipFill>
+        <p:spPr bwMode="auto">
+          <a:xfrm>
+            <a:off x="5201059" y="1460476"/>
+            <a:ext cx="1296334" cy="525463"/>
+          </a:xfrm>
+          <a:prstGeom prst="rect">
+            <a:avLst/>
+          </a:prstGeom>
+          <a:noFill/>
+          <a:extLst>
+            <a:ext uri="{909E8E84-426E-40DD-AFC4-6F175D3DCCD1}">
+              <a14:hiddenFill xmlns:a14="http://schemas.microsoft.com/office/drawing/2010/main">
+                <a:solidFill>
+                  <a:srgbClr val="FFFFFF"/>
+                </a:solidFill>
+              </a14:hiddenFill>
+            </a:ext>
+          </a:extLst>
+        </p:spPr>
+      </p:pic>
+      <p:pic>
+        <p:nvPicPr>
+          <p:cNvPr id="1060" name="Picture 36" descr="Картинки по запросу jenkins"/>
+          <p:cNvPicPr>
+            <a:picLocks noChangeAspect="1" noChangeArrowheads="1"/>
+          </p:cNvPicPr>
+          <p:nvPr/>
+        </p:nvPicPr>
+        <p:blipFill>
+          <a:blip r:embed="rId16">
+            <a:extLst>
+              <a:ext uri="{28A0092B-C50C-407E-A947-70E740481C1C}">
+                <a14:useLocalDpi xmlns:a14="http://schemas.microsoft.com/office/drawing/2010/main" val="0"/>
+              </a:ext>
+            </a:extLst>
+          </a:blip>
+          <a:srcRect/>
+          <a:stretch>
+            <a:fillRect/>
+          </a:stretch>
+        </p:blipFill>
+        <p:spPr bwMode="auto">
+          <a:xfrm>
+            <a:off x="4984050" y="2105711"/>
+            <a:ext cx="1692716" cy="544391"/>
+          </a:xfrm>
+          <a:prstGeom prst="rect">
+            <a:avLst/>
+          </a:prstGeom>
+          <a:noFill/>
+          <a:extLst>
+            <a:ext uri="{909E8E84-426E-40DD-AFC4-6F175D3DCCD1}">
+              <a14:hiddenFill xmlns:a14="http://schemas.microsoft.com/office/drawing/2010/main">
+                <a:solidFill>
+                  <a:srgbClr val="FFFFFF"/>
+                </a:solidFill>
+              </a14:hiddenFill>
+            </a:ext>
+          </a:extLst>
+        </p:spPr>
+      </p:pic>
+      <p:pic>
+        <p:nvPicPr>
+          <p:cNvPr id="1064" name="Picture 40" descr="Картинки по запросу zabbix"/>
+          <p:cNvPicPr>
+            <a:picLocks noChangeAspect="1" noChangeArrowheads="1"/>
+          </p:cNvPicPr>
+          <p:nvPr/>
+        </p:nvPicPr>
+        <p:blipFill>
+          <a:blip r:embed="rId17">
+            <a:extLst>
+              <a:ext uri="{28A0092B-C50C-407E-A947-70E740481C1C}">
+                <a14:useLocalDpi xmlns:a14="http://schemas.microsoft.com/office/drawing/2010/main" val="0"/>
+              </a:ext>
+            </a:extLst>
+          </a:blip>
+          <a:srcRect/>
+          <a:stretch>
+            <a:fillRect/>
+          </a:stretch>
+        </p:blipFill>
+        <p:spPr bwMode="auto">
+          <a:xfrm>
+            <a:off x="5131188" y="3405697"/>
+            <a:ext cx="1476375" cy="386810"/>
+          </a:xfrm>
+          <a:prstGeom prst="rect">
+            <a:avLst/>
+          </a:prstGeom>
+          <a:noFill/>
+          <a:extLst>
+            <a:ext uri="{909E8E84-426E-40DD-AFC4-6F175D3DCCD1}">
+              <a14:hiddenFill xmlns:a14="http://schemas.microsoft.com/office/drawing/2010/main">
+                <a:solidFill>
+                  <a:srgbClr val="FFFFFF"/>
+                </a:solidFill>
+              </a14:hiddenFill>
+            </a:ext>
+          </a:extLst>
+        </p:spPr>
+      </p:pic>
+      <p:pic>
+        <p:nvPicPr>
+          <p:cNvPr id="1068" name="Picture 44" descr="Картинки по запросу splunk"/>
+          <p:cNvPicPr>
+            <a:picLocks noChangeAspect="1" noChangeArrowheads="1"/>
+          </p:cNvPicPr>
+          <p:nvPr/>
+        </p:nvPicPr>
+        <p:blipFill>
+          <a:blip r:embed="rId18">
+            <a:extLst>
+              <a:ext uri="{28A0092B-C50C-407E-A947-70E740481C1C}">
+                <a14:useLocalDpi xmlns:a14="http://schemas.microsoft.com/office/drawing/2010/main" val="0"/>
+              </a:ext>
+            </a:extLst>
+          </a:blip>
+          <a:srcRect/>
+          <a:stretch>
+            <a:fillRect/>
+          </a:stretch>
+        </p:blipFill>
+        <p:spPr bwMode="auto">
+          <a:xfrm>
+            <a:off x="4966989" y="3892249"/>
+            <a:ext cx="1836777" cy="657373"/>
+          </a:xfrm>
+          <a:prstGeom prst="rect">
+            <a:avLst/>
+          </a:prstGeom>
+          <a:noFill/>
+          <a:extLst>
+            <a:ext uri="{909E8E84-426E-40DD-AFC4-6F175D3DCCD1}">
+              <a14:hiddenFill xmlns:a14="http://schemas.microsoft.com/office/drawing/2010/main">
+                <a:solidFill>
+                  <a:srgbClr val="FFFFFF"/>
+                </a:solidFill>
+              </a14:hiddenFill>
+            </a:ext>
+          </a:extLst>
+        </p:spPr>
+      </p:pic>
+      <p:cxnSp>
+        <p:nvCxnSpPr>
+          <p:cNvPr id="13" name="Прямая соединительная линия 12"/>
+          <p:cNvCxnSpPr/>
+          <p:nvPr/>
+        </p:nvCxnSpPr>
+        <p:spPr>
+          <a:xfrm flipH="1">
+            <a:off x="2247900" y="1320350"/>
+            <a:ext cx="12700" cy="3253056"/>
+          </a:xfrm>
+          <a:prstGeom prst="line">
+            <a:avLst/>
+          </a:prstGeom>
+        </p:spPr>
+        <p:style>
+          <a:lnRef idx="2">
+            <a:schemeClr val="accent1"/>
+          </a:lnRef>
+          <a:fillRef idx="0">
+            <a:schemeClr val="accent1"/>
+          </a:fillRef>
+          <a:effectRef idx="1">
+            <a:schemeClr val="accent1"/>
+          </a:effectRef>
+          <a:fontRef idx="minor">
+            <a:schemeClr val="tx1"/>
+          </a:fontRef>
+        </p:style>
+      </p:cxnSp>
+      <p:cxnSp>
+        <p:nvCxnSpPr>
+          <p:cNvPr id="15" name="Прямая соединительная линия 14"/>
+          <p:cNvCxnSpPr/>
+          <p:nvPr/>
+        </p:nvCxnSpPr>
+        <p:spPr>
+          <a:xfrm>
+            <a:off x="4730079" y="1320350"/>
+            <a:ext cx="24763" cy="3253056"/>
+          </a:xfrm>
+          <a:prstGeom prst="line">
+            <a:avLst/>
+          </a:prstGeom>
+        </p:spPr>
+        <p:style>
+          <a:lnRef idx="2">
+            <a:schemeClr val="accent1"/>
+          </a:lnRef>
+          <a:fillRef idx="0">
+            <a:schemeClr val="accent1"/>
+          </a:fillRef>
+          <a:effectRef idx="1">
+            <a:schemeClr val="accent1"/>
+          </a:effectRef>
+          <a:fontRef idx="minor">
+            <a:schemeClr val="tx1"/>
+          </a:fontRef>
+        </p:style>
+      </p:cxnSp>
+    </p:spTree>
+    <p:extLst>
+      <p:ext uri="{BB962C8B-B14F-4D97-AF65-F5344CB8AC3E}">
+        <p14:creationId xmlns:p14="http://schemas.microsoft.com/office/powerpoint/2010/main" val="2632560884"/>
+      </p:ext>
+    </p:extLst>
+  </p:cSld>
+  <p:clrMapOvr>
+    <a:masterClrMapping/>
+  </p:clrMapOvr>
+  <p:timing>
+    <p:tnLst>
+      <p:par>
+        <p:cTn id="1" dur="indefinite" restart="never" nodeType="tmRoot"/>
+      </p:par>
+    </p:tnLst>
+  </p:timing>
+</p:sld>
+</file>
+
+<file path=ppt/slides/slide31.xml><?xml version="1.0" encoding="utf-8"?>
+<p:sld xmlns:a="http://schemas.openxmlformats.org/drawingml/2006/main" xmlns:r="http://schemas.openxmlformats.org/officeDocument/2006/relationships" xmlns:p="http://schemas.openxmlformats.org/presentationml/2006/main">
+  <p:cSld>
+    <p:spTree>
+      <p:nvGrpSpPr>
+        <p:cNvPr id="1" name=""/>
+        <p:cNvGrpSpPr/>
+        <p:nvPr/>
+      </p:nvGrpSpPr>
+      <p:grpSpPr>
+        <a:xfrm>
+          <a:off x="0" y="0"/>
+          <a:ext cx="0" cy="0"/>
+          <a:chOff x="0" y="0"/>
+          <a:chExt cx="0" cy="0"/>
+        </a:xfrm>
+      </p:grpSpPr>
+      <p:sp>
+        <p:nvSpPr>
+          <p:cNvPr id="3" name="Текст 2"/>
+          <p:cNvSpPr>
+            <a:spLocks noGrp="1"/>
+          </p:cNvSpPr>
+          <p:nvPr>
+            <p:ph type="body" sz="quarter" idx="11"/>
+          </p:nvPr>
+        </p:nvSpPr>
+        <p:spPr/>
+        <p:txBody>
+          <a:bodyPr/>
+          <a:lstStyle/>
+          <a:p>
+            <a:r>
+              <a:rPr lang="en-US" dirty="0" smtClean="0"/>
+              <a:t>What we have?</a:t>
+            </a:r>
+            <a:endParaRPr lang="ru-RU" dirty="0"/>
+          </a:p>
+        </p:txBody>
+      </p:sp>
+      <p:sp>
+        <p:nvSpPr>
+          <p:cNvPr id="5" name="Прямоугольник 4"/>
+          <p:cNvSpPr/>
+          <p:nvPr/>
+        </p:nvSpPr>
+        <p:spPr>
+          <a:xfrm>
+            <a:off x="493519" y="889510"/>
+            <a:ext cx="1044575" cy="508000"/>
+          </a:xfrm>
+          <a:prstGeom prst="rect">
+            <a:avLst/>
+          </a:prstGeom>
+          <a:solidFill>
+            <a:schemeClr val="accent2">
+              <a:lumMod val="75000"/>
+            </a:schemeClr>
+          </a:solidFill>
+          <a:ln>
+            <a:solidFill>
+              <a:schemeClr val="tx1"/>
+            </a:solidFill>
+          </a:ln>
+          <a:effectLst/>
+        </p:spPr>
+        <p:style>
+          <a:lnRef idx="1">
+            <a:schemeClr val="accent1"/>
+          </a:lnRef>
+          <a:fillRef idx="3">
+            <a:schemeClr val="accent1"/>
+          </a:fillRef>
+          <a:effectRef idx="2">
+            <a:schemeClr val="accent1"/>
+          </a:effectRef>
+          <a:fontRef idx="minor">
+            <a:schemeClr val="lt1"/>
+          </a:fontRef>
+        </p:style>
+        <p:txBody>
+          <a:bodyPr rtlCol="0" anchor="ctr"/>
+          <a:lstStyle/>
+          <a:p>
+            <a:pPr algn="ctr"/>
+            <a:r>
+              <a:rPr lang="en-US" dirty="0" smtClean="0"/>
+              <a:t>ROA File Processor</a:t>
+            </a:r>
+            <a:endParaRPr lang="ru-RU" dirty="0"/>
+          </a:p>
+        </p:txBody>
+      </p:sp>
+      <p:sp>
+        <p:nvSpPr>
+          <p:cNvPr id="6" name="Прямоугольник 5"/>
+          <p:cNvSpPr/>
+          <p:nvPr/>
+        </p:nvSpPr>
+        <p:spPr>
+          <a:xfrm>
+            <a:off x="4325143" y="2691448"/>
+            <a:ext cx="622300" cy="495300"/>
+          </a:xfrm>
+          <a:prstGeom prst="rect">
+            <a:avLst/>
+          </a:prstGeom>
+          <a:solidFill>
+            <a:schemeClr val="accent4"/>
+          </a:solidFill>
+          <a:ln>
+            <a:solidFill>
+              <a:schemeClr val="tx1"/>
+            </a:solidFill>
+          </a:ln>
+          <a:effectLst/>
+        </p:spPr>
+        <p:style>
+          <a:lnRef idx="1">
+            <a:schemeClr val="accent1"/>
+          </a:lnRef>
+          <a:fillRef idx="3">
+            <a:schemeClr val="accent1"/>
+          </a:fillRef>
+          <a:effectRef idx="2">
+            <a:schemeClr val="accent1"/>
+          </a:effectRef>
+          <a:fontRef idx="minor">
+            <a:schemeClr val="lt1"/>
+          </a:fontRef>
+        </p:style>
+        <p:txBody>
+          <a:bodyPr rtlCol="0" anchor="ctr"/>
+          <a:lstStyle/>
+          <a:p>
+            <a:pPr algn="ctr"/>
+            <a:r>
+              <a:rPr lang="en-US" dirty="0" smtClean="0"/>
+              <a:t>Tax</a:t>
+            </a:r>
+            <a:endParaRPr lang="ru-RU" dirty="0"/>
+          </a:p>
+        </p:txBody>
+      </p:sp>
+      <p:sp>
+        <p:nvSpPr>
+          <p:cNvPr id="7" name="Прямоугольник 6"/>
+          <p:cNvSpPr/>
+          <p:nvPr/>
+        </p:nvSpPr>
+        <p:spPr>
+          <a:xfrm>
+            <a:off x="873911" y="3706465"/>
+            <a:ext cx="635000" cy="508000"/>
+          </a:xfrm>
+          <a:prstGeom prst="rect">
+            <a:avLst/>
+          </a:prstGeom>
+          <a:solidFill>
+            <a:schemeClr val="accent4"/>
+          </a:solidFill>
+          <a:ln>
+            <a:solidFill>
+              <a:schemeClr val="tx1"/>
+            </a:solidFill>
+          </a:ln>
+          <a:effectLst/>
+        </p:spPr>
+        <p:style>
+          <a:lnRef idx="1">
+            <a:schemeClr val="accent1"/>
+          </a:lnRef>
+          <a:fillRef idx="3">
+            <a:schemeClr val="accent1"/>
+          </a:fillRef>
+          <a:effectRef idx="2">
+            <a:schemeClr val="accent1"/>
+          </a:effectRef>
+          <a:fontRef idx="minor">
+            <a:schemeClr val="lt1"/>
+          </a:fontRef>
+        </p:style>
+        <p:txBody>
+          <a:bodyPr rtlCol="0" anchor="ctr"/>
+          <a:lstStyle/>
+          <a:p>
+            <a:pPr algn="ctr"/>
+            <a:r>
+              <a:rPr lang="en-US" dirty="0" smtClean="0"/>
+              <a:t>CRM </a:t>
+            </a:r>
+            <a:r>
+              <a:rPr lang="en-US" dirty="0" err="1" smtClean="0"/>
+              <a:t>Integ</a:t>
+            </a:r>
+            <a:endParaRPr lang="ru-RU" dirty="0"/>
+          </a:p>
+        </p:txBody>
+      </p:sp>
+      <p:sp>
+        <p:nvSpPr>
+          <p:cNvPr id="8" name="Прямоугольник 7"/>
+          <p:cNvSpPr/>
+          <p:nvPr/>
+        </p:nvSpPr>
+        <p:spPr>
+          <a:xfrm>
+            <a:off x="5489577" y="2883726"/>
+            <a:ext cx="927100" cy="508000"/>
+          </a:xfrm>
+          <a:prstGeom prst="rect">
+            <a:avLst/>
+          </a:prstGeom>
+          <a:solidFill>
+            <a:schemeClr val="accent4"/>
+          </a:solidFill>
+          <a:ln>
+            <a:solidFill>
+              <a:schemeClr val="tx1"/>
+            </a:solidFill>
+          </a:ln>
+          <a:effectLst/>
+        </p:spPr>
+        <p:style>
+          <a:lnRef idx="1">
+            <a:schemeClr val="accent1"/>
+          </a:lnRef>
+          <a:fillRef idx="3">
+            <a:schemeClr val="accent1"/>
+          </a:fillRef>
+          <a:effectRef idx="2">
+            <a:schemeClr val="accent1"/>
+          </a:effectRef>
+          <a:fontRef idx="minor">
+            <a:schemeClr val="lt1"/>
+          </a:fontRef>
+        </p:style>
+        <p:txBody>
+          <a:bodyPr rtlCol="0" anchor="ctr"/>
+          <a:lstStyle/>
+          <a:p>
+            <a:pPr algn="ctr"/>
+            <a:r>
+              <a:rPr lang="en-US" dirty="0" smtClean="0"/>
+              <a:t>Payment</a:t>
+            </a:r>
+            <a:endParaRPr lang="ru-RU" dirty="0"/>
+          </a:p>
+        </p:txBody>
+      </p:sp>
+      <p:sp>
+        <p:nvSpPr>
+          <p:cNvPr id="9" name="Прямоугольник 8"/>
+          <p:cNvSpPr/>
+          <p:nvPr/>
+        </p:nvSpPr>
+        <p:spPr>
+          <a:xfrm>
+            <a:off x="5130800" y="4162396"/>
+            <a:ext cx="1111250" cy="508000"/>
+          </a:xfrm>
+          <a:prstGeom prst="rect">
+            <a:avLst/>
+          </a:prstGeom>
+          <a:solidFill>
+            <a:schemeClr val="accent4"/>
+          </a:solidFill>
+          <a:ln>
+            <a:solidFill>
+              <a:schemeClr val="tx1"/>
+            </a:solidFill>
+          </a:ln>
+          <a:effectLst/>
+        </p:spPr>
+        <p:style>
+          <a:lnRef idx="1">
+            <a:schemeClr val="accent1"/>
+          </a:lnRef>
+          <a:fillRef idx="3">
+            <a:schemeClr val="accent1"/>
+          </a:fillRef>
+          <a:effectRef idx="2">
+            <a:schemeClr val="accent1"/>
+          </a:effectRef>
+          <a:fontRef idx="minor">
+            <a:schemeClr val="lt1"/>
+          </a:fontRef>
+        </p:style>
+        <p:txBody>
+          <a:bodyPr rtlCol="0" anchor="ctr"/>
+          <a:lstStyle/>
+          <a:p>
+            <a:pPr algn="ctr"/>
+            <a:r>
+              <a:rPr lang="en-US" dirty="0" smtClean="0"/>
+              <a:t>Reporting</a:t>
+            </a:r>
+            <a:endParaRPr lang="ru-RU" dirty="0"/>
+          </a:p>
+        </p:txBody>
+      </p:sp>
+      <p:sp>
+        <p:nvSpPr>
+          <p:cNvPr id="10" name="Прямоугольник 9"/>
+          <p:cNvSpPr/>
+          <p:nvPr/>
+        </p:nvSpPr>
+        <p:spPr>
+          <a:xfrm>
+            <a:off x="5480057" y="2324832"/>
+            <a:ext cx="927100" cy="508000"/>
+          </a:xfrm>
+          <a:prstGeom prst="rect">
+            <a:avLst/>
+          </a:prstGeom>
+          <a:solidFill>
+            <a:schemeClr val="accent4"/>
+          </a:solidFill>
+          <a:ln>
+            <a:solidFill>
+              <a:schemeClr val="tx1"/>
+            </a:solidFill>
+          </a:ln>
+          <a:effectLst/>
+        </p:spPr>
+        <p:style>
+          <a:lnRef idx="1">
+            <a:schemeClr val="accent1"/>
+          </a:lnRef>
+          <a:fillRef idx="3">
+            <a:schemeClr val="accent1"/>
+          </a:fillRef>
+          <a:effectRef idx="2">
+            <a:schemeClr val="accent1"/>
+          </a:effectRef>
+          <a:fontRef idx="minor">
+            <a:schemeClr val="lt1"/>
+          </a:fontRef>
+        </p:style>
+        <p:txBody>
+          <a:bodyPr rtlCol="0" anchor="ctr"/>
+          <a:lstStyle/>
+          <a:p>
+            <a:pPr algn="ctr"/>
+            <a:r>
+              <a:rPr lang="en-US" dirty="0" smtClean="0"/>
+              <a:t>RLNK</a:t>
+            </a:r>
+            <a:endParaRPr lang="ru-RU" dirty="0"/>
+          </a:p>
+        </p:txBody>
+      </p:sp>
+      <p:sp>
+        <p:nvSpPr>
+          <p:cNvPr id="11" name="Прямоугольник 10"/>
+          <p:cNvSpPr/>
+          <p:nvPr/>
+        </p:nvSpPr>
+        <p:spPr>
+          <a:xfrm>
+            <a:off x="2876549" y="838168"/>
+            <a:ext cx="927100" cy="508000"/>
+          </a:xfrm>
+          <a:prstGeom prst="rect">
+            <a:avLst/>
+          </a:prstGeom>
+          <a:solidFill>
+            <a:schemeClr val="accent4"/>
+          </a:solidFill>
+          <a:ln>
+            <a:solidFill>
+              <a:schemeClr val="tx1"/>
+            </a:solidFill>
+          </a:ln>
+          <a:effectLst/>
+        </p:spPr>
+        <p:style>
+          <a:lnRef idx="1">
+            <a:schemeClr val="accent1"/>
+          </a:lnRef>
+          <a:fillRef idx="3">
+            <a:schemeClr val="accent1"/>
+          </a:fillRef>
+          <a:effectRef idx="2">
+            <a:schemeClr val="accent1"/>
+          </a:effectRef>
+          <a:fontRef idx="minor">
+            <a:schemeClr val="lt1"/>
+          </a:fontRef>
+        </p:style>
+        <p:txBody>
+          <a:bodyPr rtlCol="0" anchor="ctr"/>
+          <a:lstStyle/>
+          <a:p>
+            <a:pPr algn="ctr"/>
+            <a:r>
+              <a:rPr lang="en-US" dirty="0" smtClean="0"/>
+              <a:t>PRM</a:t>
+            </a:r>
+            <a:endParaRPr lang="ru-RU" dirty="0"/>
+          </a:p>
+        </p:txBody>
+      </p:sp>
+      <p:sp>
+        <p:nvSpPr>
+          <p:cNvPr id="12" name="Прямоугольник 11"/>
+          <p:cNvSpPr/>
+          <p:nvPr/>
+        </p:nvSpPr>
+        <p:spPr>
+          <a:xfrm>
+            <a:off x="4714877" y="1750568"/>
+            <a:ext cx="1238250" cy="508000"/>
+          </a:xfrm>
+          <a:prstGeom prst="rect">
+            <a:avLst/>
+          </a:prstGeom>
+          <a:solidFill>
+            <a:schemeClr val="accent4"/>
+          </a:solidFill>
+          <a:ln>
+            <a:solidFill>
+              <a:schemeClr val="tx1"/>
+            </a:solidFill>
+          </a:ln>
+          <a:effectLst/>
+        </p:spPr>
+        <p:style>
+          <a:lnRef idx="1">
+            <a:schemeClr val="accent1"/>
+          </a:lnRef>
+          <a:fillRef idx="3">
+            <a:schemeClr val="accent1"/>
+          </a:fillRef>
+          <a:effectRef idx="2">
+            <a:schemeClr val="accent1"/>
+          </a:effectRef>
+          <a:fontRef idx="minor">
+            <a:schemeClr val="lt1"/>
+          </a:fontRef>
+        </p:style>
+        <p:txBody>
+          <a:bodyPr rtlCol="0" anchor="ctr"/>
+          <a:lstStyle/>
+          <a:p>
+            <a:pPr algn="ctr"/>
+            <a:r>
+              <a:rPr lang="en-US" dirty="0" smtClean="0"/>
+              <a:t>Promotions</a:t>
+            </a:r>
+            <a:endParaRPr lang="ru-RU" dirty="0"/>
+          </a:p>
+        </p:txBody>
+      </p:sp>
+      <p:sp>
+        <p:nvSpPr>
+          <p:cNvPr id="13" name="Прямоугольник 12"/>
+          <p:cNvSpPr/>
+          <p:nvPr/>
+        </p:nvSpPr>
+        <p:spPr>
+          <a:xfrm>
+            <a:off x="4400550" y="1057021"/>
+            <a:ext cx="1238250" cy="508000"/>
+          </a:xfrm>
+          <a:prstGeom prst="rect">
+            <a:avLst/>
+          </a:prstGeom>
+          <a:solidFill>
+            <a:schemeClr val="accent4"/>
+          </a:solidFill>
+          <a:ln>
+            <a:solidFill>
+              <a:schemeClr val="tx1"/>
+            </a:solidFill>
+          </a:ln>
+          <a:effectLst/>
+        </p:spPr>
+        <p:style>
+          <a:lnRef idx="1">
+            <a:schemeClr val="accent1"/>
+          </a:lnRef>
+          <a:fillRef idx="3">
+            <a:schemeClr val="accent1"/>
+          </a:fillRef>
+          <a:effectRef idx="2">
+            <a:schemeClr val="accent1"/>
+          </a:effectRef>
+          <a:fontRef idx="minor">
+            <a:schemeClr val="lt1"/>
+          </a:fontRef>
+        </p:style>
+        <p:txBody>
+          <a:bodyPr rtlCol="0" anchor="ctr"/>
+          <a:lstStyle/>
+          <a:p>
+            <a:pPr algn="ctr"/>
+            <a:r>
+              <a:rPr lang="en-US" dirty="0" smtClean="0"/>
+              <a:t>Reprints</a:t>
+            </a:r>
+            <a:endParaRPr lang="ru-RU" dirty="0"/>
+          </a:p>
+        </p:txBody>
+      </p:sp>
+      <p:sp>
+        <p:nvSpPr>
+          <p:cNvPr id="15" name="Прямоугольник 14"/>
+          <p:cNvSpPr/>
+          <p:nvPr/>
+        </p:nvSpPr>
+        <p:spPr>
+          <a:xfrm>
+            <a:off x="440139" y="1784858"/>
+            <a:ext cx="1222375" cy="508000"/>
+          </a:xfrm>
+          <a:prstGeom prst="rect">
+            <a:avLst/>
+          </a:prstGeom>
+          <a:solidFill>
+            <a:schemeClr val="accent2">
+              <a:lumMod val="75000"/>
+            </a:schemeClr>
+          </a:solidFill>
+          <a:ln>
+            <a:solidFill>
+              <a:schemeClr val="tx1"/>
+            </a:solidFill>
+          </a:ln>
+          <a:effectLst/>
+        </p:spPr>
+        <p:style>
+          <a:lnRef idx="1">
+            <a:schemeClr val="accent1"/>
+          </a:lnRef>
+          <a:fillRef idx="3">
+            <a:schemeClr val="accent1"/>
+          </a:fillRef>
+          <a:effectRef idx="2">
+            <a:schemeClr val="accent1"/>
+          </a:effectRef>
+          <a:fontRef idx="minor">
+            <a:schemeClr val="lt1"/>
+          </a:fontRef>
+        </p:style>
+        <p:txBody>
+          <a:bodyPr rtlCol="0" anchor="ctr"/>
+          <a:lstStyle/>
+          <a:p>
+            <a:pPr algn="ctr"/>
+            <a:r>
+              <a:rPr lang="en-US" dirty="0" smtClean="0"/>
+              <a:t>ROA REST 1</a:t>
+            </a:r>
+            <a:endParaRPr lang="ru-RU" dirty="0"/>
+          </a:p>
+        </p:txBody>
+      </p:sp>
+      <p:sp>
+        <p:nvSpPr>
+          <p:cNvPr id="16" name="Прямоугольник 15"/>
+          <p:cNvSpPr/>
+          <p:nvPr/>
+        </p:nvSpPr>
+        <p:spPr>
+          <a:xfrm>
+            <a:off x="440139" y="2818224"/>
+            <a:ext cx="1222375" cy="508000"/>
+          </a:xfrm>
+          <a:prstGeom prst="rect">
+            <a:avLst/>
+          </a:prstGeom>
+          <a:solidFill>
+            <a:schemeClr val="accent2">
+              <a:lumMod val="75000"/>
+            </a:schemeClr>
+          </a:solidFill>
+          <a:ln>
+            <a:solidFill>
+              <a:schemeClr val="tx1"/>
+            </a:solidFill>
+          </a:ln>
+          <a:effectLst/>
+        </p:spPr>
+        <p:style>
+          <a:lnRef idx="1">
+            <a:schemeClr val="accent1"/>
+          </a:lnRef>
+          <a:fillRef idx="3">
+            <a:schemeClr val="accent1"/>
+          </a:fillRef>
+          <a:effectRef idx="2">
+            <a:schemeClr val="accent1"/>
+          </a:effectRef>
+          <a:fontRef idx="minor">
+            <a:schemeClr val="lt1"/>
+          </a:fontRef>
+        </p:style>
+        <p:txBody>
+          <a:bodyPr rtlCol="0" anchor="ctr"/>
+          <a:lstStyle/>
+          <a:p>
+            <a:pPr algn="ctr"/>
+            <a:r>
+              <a:rPr lang="en-US" dirty="0" smtClean="0"/>
+              <a:t>ROA REST 2</a:t>
+            </a:r>
+            <a:endParaRPr lang="ru-RU" dirty="0"/>
+          </a:p>
+        </p:txBody>
+      </p:sp>
+      <p:sp>
+        <p:nvSpPr>
+          <p:cNvPr id="17" name="Прямоугольник 16"/>
+          <p:cNvSpPr/>
+          <p:nvPr/>
+        </p:nvSpPr>
+        <p:spPr>
+          <a:xfrm>
+            <a:off x="2349896" y="2078833"/>
+            <a:ext cx="1222375" cy="508000"/>
+          </a:xfrm>
+          <a:prstGeom prst="rect">
+            <a:avLst/>
+          </a:prstGeom>
+          <a:solidFill>
+            <a:schemeClr val="accent2">
+              <a:lumMod val="75000"/>
+            </a:schemeClr>
+          </a:solidFill>
+          <a:ln>
+            <a:solidFill>
+              <a:schemeClr val="tx1"/>
+            </a:solidFill>
+          </a:ln>
+          <a:effectLst/>
+        </p:spPr>
+        <p:style>
+          <a:lnRef idx="1">
+            <a:schemeClr val="accent1"/>
+          </a:lnRef>
+          <a:fillRef idx="3">
+            <a:schemeClr val="accent1"/>
+          </a:fillRef>
+          <a:effectRef idx="2">
+            <a:schemeClr val="accent1"/>
+          </a:effectRef>
+          <a:fontRef idx="minor">
+            <a:schemeClr val="lt1"/>
+          </a:fontRef>
+        </p:style>
+        <p:txBody>
+          <a:bodyPr rtlCol="0" anchor="ctr"/>
+          <a:lstStyle/>
+          <a:p>
+            <a:pPr algn="ctr"/>
+            <a:r>
+              <a:rPr lang="en-US" dirty="0" smtClean="0"/>
+              <a:t>ROA Payment</a:t>
+            </a:r>
+            <a:endParaRPr lang="ru-RU" dirty="0"/>
+          </a:p>
+        </p:txBody>
+      </p:sp>
+      <p:sp>
+        <p:nvSpPr>
+          <p:cNvPr id="18" name="Прямоугольник 17"/>
+          <p:cNvSpPr/>
+          <p:nvPr/>
+        </p:nvSpPr>
+        <p:spPr>
+          <a:xfrm>
+            <a:off x="3647281" y="3411347"/>
+            <a:ext cx="1222375" cy="508000"/>
+          </a:xfrm>
+          <a:prstGeom prst="rect">
+            <a:avLst/>
+          </a:prstGeom>
+          <a:solidFill>
+            <a:schemeClr val="accent2">
+              <a:lumMod val="75000"/>
+            </a:schemeClr>
+          </a:solidFill>
+          <a:ln>
+            <a:solidFill>
+              <a:schemeClr val="tx1"/>
+            </a:solidFill>
+          </a:ln>
+          <a:effectLst/>
+        </p:spPr>
+        <p:style>
+          <a:lnRef idx="1">
+            <a:schemeClr val="accent1"/>
+          </a:lnRef>
+          <a:fillRef idx="3">
+            <a:schemeClr val="accent1"/>
+          </a:fillRef>
+          <a:effectRef idx="2">
+            <a:schemeClr val="accent1"/>
+          </a:effectRef>
+          <a:fontRef idx="minor">
+            <a:schemeClr val="lt1"/>
+          </a:fontRef>
+        </p:style>
+        <p:txBody>
+          <a:bodyPr rtlCol="0" anchor="ctr"/>
+          <a:lstStyle/>
+          <a:p>
+            <a:pPr algn="ctr"/>
+            <a:r>
+              <a:rPr lang="en-US" dirty="0" smtClean="0"/>
+              <a:t>ROA </a:t>
+            </a:r>
+            <a:r>
+              <a:rPr lang="en-US" dirty="0" err="1" smtClean="0"/>
+              <a:t>Pubportal</a:t>
+            </a:r>
+            <a:endParaRPr lang="ru-RU" dirty="0"/>
+          </a:p>
+        </p:txBody>
+      </p:sp>
+      <p:sp>
+        <p:nvSpPr>
+          <p:cNvPr id="19" name="Прямоугольник 18"/>
+          <p:cNvSpPr/>
+          <p:nvPr/>
+        </p:nvSpPr>
+        <p:spPr>
+          <a:xfrm>
+            <a:off x="2890043" y="2725485"/>
+            <a:ext cx="1222375" cy="508000"/>
+          </a:xfrm>
+          <a:prstGeom prst="rect">
+            <a:avLst/>
+          </a:prstGeom>
+          <a:solidFill>
+            <a:schemeClr val="accent2">
+              <a:lumMod val="75000"/>
+            </a:schemeClr>
+          </a:solidFill>
+          <a:ln>
+            <a:solidFill>
+              <a:schemeClr val="tx1"/>
+            </a:solidFill>
+          </a:ln>
+          <a:effectLst/>
+        </p:spPr>
+        <p:style>
+          <a:lnRef idx="1">
+            <a:schemeClr val="accent1"/>
+          </a:lnRef>
+          <a:fillRef idx="3">
+            <a:schemeClr val="accent1"/>
+          </a:fillRef>
+          <a:effectRef idx="2">
+            <a:schemeClr val="accent1"/>
+          </a:effectRef>
+          <a:fontRef idx="minor">
+            <a:schemeClr val="lt1"/>
+          </a:fontRef>
+        </p:style>
+        <p:txBody>
+          <a:bodyPr rtlCol="0" anchor="ctr"/>
+          <a:lstStyle/>
+          <a:p>
+            <a:pPr algn="ctr"/>
+            <a:r>
+              <a:rPr lang="en-US" dirty="0" smtClean="0"/>
+              <a:t>ROA Admin</a:t>
+            </a:r>
+            <a:endParaRPr lang="ru-RU" dirty="0"/>
+          </a:p>
+        </p:txBody>
+      </p:sp>
+      <p:cxnSp>
+        <p:nvCxnSpPr>
+          <p:cNvPr id="27" name="Прямая со стрелкой 26"/>
+          <p:cNvCxnSpPr>
+            <a:stCxn id="17" idx="0"/>
+            <a:endCxn id="11" idx="2"/>
+          </p:cNvCxnSpPr>
+          <p:nvPr/>
+        </p:nvCxnSpPr>
+        <p:spPr>
+          <a:xfrm flipV="1">
+            <a:off x="2961084" y="1346168"/>
+            <a:ext cx="379015" cy="732665"/>
+          </a:xfrm>
+          <a:prstGeom prst="straightConnector1">
+            <a:avLst/>
+          </a:prstGeom>
+          <a:ln>
+            <a:tailEnd type="triangle"/>
+          </a:ln>
+        </p:spPr>
+        <p:style>
+          <a:lnRef idx="2">
+            <a:schemeClr val="accent1"/>
+          </a:lnRef>
+          <a:fillRef idx="0">
+            <a:schemeClr val="accent1"/>
+          </a:fillRef>
+          <a:effectRef idx="1">
+            <a:schemeClr val="accent1"/>
+          </a:effectRef>
+          <a:fontRef idx="minor">
+            <a:schemeClr val="tx1"/>
+          </a:fontRef>
+        </p:style>
+      </p:cxnSp>
+      <p:cxnSp>
+        <p:nvCxnSpPr>
+          <p:cNvPr id="36" name="Прямая со стрелкой 35"/>
+          <p:cNvCxnSpPr>
+            <a:stCxn id="16" idx="3"/>
+            <a:endCxn id="11" idx="1"/>
+          </p:cNvCxnSpPr>
+          <p:nvPr/>
+        </p:nvCxnSpPr>
+        <p:spPr>
+          <a:xfrm flipV="1">
+            <a:off x="1662514" y="1092168"/>
+            <a:ext cx="1214035" cy="1980056"/>
+          </a:xfrm>
+          <a:prstGeom prst="straightConnector1">
+            <a:avLst/>
+          </a:prstGeom>
+          <a:ln>
+            <a:tailEnd type="triangle"/>
+          </a:ln>
+        </p:spPr>
+        <p:style>
+          <a:lnRef idx="2">
+            <a:schemeClr val="accent1"/>
+          </a:lnRef>
+          <a:fillRef idx="0">
+            <a:schemeClr val="accent1"/>
+          </a:fillRef>
+          <a:effectRef idx="1">
+            <a:schemeClr val="accent1"/>
+          </a:effectRef>
+          <a:fontRef idx="minor">
+            <a:schemeClr val="tx1"/>
+          </a:fontRef>
+        </p:style>
+      </p:cxnSp>
+      <p:cxnSp>
+        <p:nvCxnSpPr>
+          <p:cNvPr id="38" name="Прямая со стрелкой 37"/>
+          <p:cNvCxnSpPr>
+            <a:stCxn id="15" idx="0"/>
+            <a:endCxn id="11" idx="1"/>
+          </p:cNvCxnSpPr>
+          <p:nvPr/>
+        </p:nvCxnSpPr>
+        <p:spPr>
+          <a:xfrm flipV="1">
+            <a:off x="1051327" y="1092168"/>
+            <a:ext cx="1825222" cy="692690"/>
+          </a:xfrm>
+          <a:prstGeom prst="straightConnector1">
+            <a:avLst/>
+          </a:prstGeom>
+          <a:ln>
+            <a:tailEnd type="triangle"/>
+          </a:ln>
+        </p:spPr>
+        <p:style>
+          <a:lnRef idx="2">
+            <a:schemeClr val="accent1"/>
+          </a:lnRef>
+          <a:fillRef idx="0">
+            <a:schemeClr val="accent1"/>
+          </a:fillRef>
+          <a:effectRef idx="1">
+            <a:schemeClr val="accent1"/>
+          </a:effectRef>
+          <a:fontRef idx="minor">
+            <a:schemeClr val="tx1"/>
+          </a:fontRef>
+        </p:style>
+      </p:cxnSp>
+      <p:cxnSp>
+        <p:nvCxnSpPr>
+          <p:cNvPr id="41" name="Прямая со стрелкой 40"/>
+          <p:cNvCxnSpPr>
+            <a:stCxn id="19" idx="0"/>
+            <a:endCxn id="17" idx="2"/>
+          </p:cNvCxnSpPr>
+          <p:nvPr/>
+        </p:nvCxnSpPr>
+        <p:spPr>
+          <a:xfrm flipH="1" flipV="1">
+            <a:off x="2961084" y="2586833"/>
+            <a:ext cx="540147" cy="138652"/>
+          </a:xfrm>
+          <a:prstGeom prst="straightConnector1">
+            <a:avLst/>
+          </a:prstGeom>
+          <a:ln>
+            <a:tailEnd type="triangle"/>
+          </a:ln>
+        </p:spPr>
+        <p:style>
+          <a:lnRef idx="2">
+            <a:schemeClr val="accent1"/>
+          </a:lnRef>
+          <a:fillRef idx="0">
+            <a:schemeClr val="accent1"/>
+          </a:fillRef>
+          <a:effectRef idx="1">
+            <a:schemeClr val="accent1"/>
+          </a:effectRef>
+          <a:fontRef idx="minor">
+            <a:schemeClr val="tx1"/>
+          </a:fontRef>
+        </p:style>
+      </p:cxnSp>
+      <p:cxnSp>
+        <p:nvCxnSpPr>
+          <p:cNvPr id="43" name="Прямая со стрелкой 42"/>
+          <p:cNvCxnSpPr>
+            <a:stCxn id="19" idx="1"/>
+            <a:endCxn id="15" idx="3"/>
+          </p:cNvCxnSpPr>
+          <p:nvPr/>
+        </p:nvCxnSpPr>
+        <p:spPr>
+          <a:xfrm flipH="1" flipV="1">
+            <a:off x="1662514" y="2038858"/>
+            <a:ext cx="1227529" cy="940627"/>
+          </a:xfrm>
+          <a:prstGeom prst="straightConnector1">
+            <a:avLst/>
+          </a:prstGeom>
+          <a:ln>
+            <a:tailEnd type="triangle"/>
+          </a:ln>
+        </p:spPr>
+        <p:style>
+          <a:lnRef idx="2">
+            <a:schemeClr val="accent1"/>
+          </a:lnRef>
+          <a:fillRef idx="0">
+            <a:schemeClr val="accent1"/>
+          </a:fillRef>
+          <a:effectRef idx="1">
+            <a:schemeClr val="accent1"/>
+          </a:effectRef>
+          <a:fontRef idx="minor">
+            <a:schemeClr val="tx1"/>
+          </a:fontRef>
+        </p:style>
+      </p:cxnSp>
+      <p:cxnSp>
+        <p:nvCxnSpPr>
+          <p:cNvPr id="45" name="Прямая со стрелкой 44"/>
+          <p:cNvCxnSpPr>
+            <a:stCxn id="19" idx="1"/>
+            <a:endCxn id="16" idx="3"/>
+          </p:cNvCxnSpPr>
+          <p:nvPr/>
+        </p:nvCxnSpPr>
+        <p:spPr>
+          <a:xfrm flipH="1">
+            <a:off x="1662514" y="2979485"/>
+            <a:ext cx="1227529" cy="92739"/>
+          </a:xfrm>
+          <a:prstGeom prst="straightConnector1">
+            <a:avLst/>
+          </a:prstGeom>
+          <a:ln>
+            <a:tailEnd type="triangle"/>
+          </a:ln>
+        </p:spPr>
+        <p:style>
+          <a:lnRef idx="2">
+            <a:schemeClr val="accent1"/>
+          </a:lnRef>
+          <a:fillRef idx="0">
+            <a:schemeClr val="accent1"/>
+          </a:fillRef>
+          <a:effectRef idx="1">
+            <a:schemeClr val="accent1"/>
+          </a:effectRef>
+          <a:fontRef idx="minor">
+            <a:schemeClr val="tx1"/>
+          </a:fontRef>
+        </p:style>
+      </p:cxnSp>
+      <p:cxnSp>
+        <p:nvCxnSpPr>
+          <p:cNvPr id="47" name="Прямая со стрелкой 46"/>
+          <p:cNvCxnSpPr>
+            <a:stCxn id="17" idx="3"/>
+            <a:endCxn id="13" idx="1"/>
+          </p:cNvCxnSpPr>
+          <p:nvPr/>
+        </p:nvCxnSpPr>
+        <p:spPr>
+          <a:xfrm flipV="1">
+            <a:off x="3572271" y="1311021"/>
+            <a:ext cx="828279" cy="1021812"/>
+          </a:xfrm>
+          <a:prstGeom prst="straightConnector1">
+            <a:avLst/>
+          </a:prstGeom>
+          <a:ln>
+            <a:tailEnd type="triangle"/>
+          </a:ln>
+        </p:spPr>
+        <p:style>
+          <a:lnRef idx="2">
+            <a:schemeClr val="accent1"/>
+          </a:lnRef>
+          <a:fillRef idx="0">
+            <a:schemeClr val="accent1"/>
+          </a:fillRef>
+          <a:effectRef idx="1">
+            <a:schemeClr val="accent1"/>
+          </a:effectRef>
+          <a:fontRef idx="minor">
+            <a:schemeClr val="tx1"/>
+          </a:fontRef>
+        </p:style>
+      </p:cxnSp>
+      <p:cxnSp>
+        <p:nvCxnSpPr>
+          <p:cNvPr id="49" name="Прямая со стрелкой 48"/>
+          <p:cNvCxnSpPr>
+            <a:stCxn id="17" idx="3"/>
+            <a:endCxn id="8" idx="1"/>
+          </p:cNvCxnSpPr>
+          <p:nvPr/>
+        </p:nvCxnSpPr>
+        <p:spPr>
+          <a:xfrm>
+            <a:off x="3572271" y="2332833"/>
+            <a:ext cx="1917306" cy="804893"/>
+          </a:xfrm>
+          <a:prstGeom prst="straightConnector1">
+            <a:avLst/>
+          </a:prstGeom>
+          <a:ln>
+            <a:tailEnd type="triangle"/>
+          </a:ln>
+        </p:spPr>
+        <p:style>
+          <a:lnRef idx="2">
+            <a:schemeClr val="accent1"/>
+          </a:lnRef>
+          <a:fillRef idx="0">
+            <a:schemeClr val="accent1"/>
+          </a:fillRef>
+          <a:effectRef idx="1">
+            <a:schemeClr val="accent1"/>
+          </a:effectRef>
+          <a:fontRef idx="minor">
+            <a:schemeClr val="tx1"/>
+          </a:fontRef>
+        </p:style>
+      </p:cxnSp>
+      <p:cxnSp>
+        <p:nvCxnSpPr>
+          <p:cNvPr id="51" name="Прямая со стрелкой 50"/>
+          <p:cNvCxnSpPr>
+            <a:stCxn id="17" idx="3"/>
+            <a:endCxn id="12" idx="1"/>
+          </p:cNvCxnSpPr>
+          <p:nvPr/>
+        </p:nvCxnSpPr>
+        <p:spPr>
+          <a:xfrm flipV="1">
+            <a:off x="3572271" y="2004568"/>
+            <a:ext cx="1142606" cy="328265"/>
+          </a:xfrm>
+          <a:prstGeom prst="straightConnector1">
+            <a:avLst/>
+          </a:prstGeom>
+          <a:ln>
+            <a:tailEnd type="triangle"/>
+          </a:ln>
+        </p:spPr>
+        <p:style>
+          <a:lnRef idx="2">
+            <a:schemeClr val="accent1"/>
+          </a:lnRef>
+          <a:fillRef idx="0">
+            <a:schemeClr val="accent1"/>
+          </a:fillRef>
+          <a:effectRef idx="1">
+            <a:schemeClr val="accent1"/>
+          </a:effectRef>
+          <a:fontRef idx="minor">
+            <a:schemeClr val="tx1"/>
+          </a:fontRef>
+        </p:style>
+      </p:cxnSp>
+      <p:cxnSp>
+        <p:nvCxnSpPr>
+          <p:cNvPr id="64" name="Прямая со стрелкой 63"/>
+          <p:cNvCxnSpPr>
+            <a:stCxn id="17" idx="2"/>
+            <a:endCxn id="7" idx="0"/>
+          </p:cNvCxnSpPr>
+          <p:nvPr/>
+        </p:nvCxnSpPr>
+        <p:spPr>
+          <a:xfrm flipH="1">
+            <a:off x="1191411" y="2586833"/>
+            <a:ext cx="1769673" cy="1119632"/>
+          </a:xfrm>
+          <a:prstGeom prst="straightConnector1">
+            <a:avLst/>
+          </a:prstGeom>
+          <a:ln>
+            <a:tailEnd type="triangle"/>
+          </a:ln>
+        </p:spPr>
+        <p:style>
+          <a:lnRef idx="2">
+            <a:schemeClr val="accent1"/>
+          </a:lnRef>
+          <a:fillRef idx="0">
+            <a:schemeClr val="accent1"/>
+          </a:fillRef>
+          <a:effectRef idx="1">
+            <a:schemeClr val="accent1"/>
+          </a:effectRef>
+          <a:fontRef idx="minor">
+            <a:schemeClr val="tx1"/>
+          </a:fontRef>
+        </p:style>
+      </p:cxnSp>
+      <p:cxnSp>
+        <p:nvCxnSpPr>
+          <p:cNvPr id="66" name="Прямая со стрелкой 65"/>
+          <p:cNvCxnSpPr>
+            <a:stCxn id="17" idx="2"/>
+            <a:endCxn id="6" idx="0"/>
+          </p:cNvCxnSpPr>
+          <p:nvPr/>
+        </p:nvCxnSpPr>
+        <p:spPr>
+          <a:xfrm>
+            <a:off x="2961084" y="2586833"/>
+            <a:ext cx="1675209" cy="104615"/>
+          </a:xfrm>
+          <a:prstGeom prst="straightConnector1">
+            <a:avLst/>
+          </a:prstGeom>
+          <a:ln>
+            <a:tailEnd type="triangle"/>
+          </a:ln>
+        </p:spPr>
+        <p:style>
+          <a:lnRef idx="2">
+            <a:schemeClr val="accent1"/>
+          </a:lnRef>
+          <a:fillRef idx="0">
+            <a:schemeClr val="accent1"/>
+          </a:fillRef>
+          <a:effectRef idx="1">
+            <a:schemeClr val="accent1"/>
+          </a:effectRef>
+          <a:fontRef idx="minor">
+            <a:schemeClr val="tx1"/>
+          </a:fontRef>
+        </p:style>
+      </p:cxnSp>
+      <p:cxnSp>
+        <p:nvCxnSpPr>
+          <p:cNvPr id="68" name="Прямая со стрелкой 67"/>
+          <p:cNvCxnSpPr>
+            <a:stCxn id="17" idx="3"/>
+            <a:endCxn id="17" idx="3"/>
+          </p:cNvCxnSpPr>
+          <p:nvPr/>
+        </p:nvCxnSpPr>
+        <p:spPr>
+          <a:xfrm>
+            <a:off x="3572271" y="2332833"/>
+            <a:ext cx="0" cy="0"/>
+          </a:xfrm>
+          <a:prstGeom prst="straightConnector1">
+            <a:avLst/>
+          </a:prstGeom>
+          <a:ln>
+            <a:tailEnd type="triangle"/>
+          </a:ln>
+        </p:spPr>
+        <p:style>
+          <a:lnRef idx="2">
+            <a:schemeClr val="accent1"/>
+          </a:lnRef>
+          <a:fillRef idx="0">
+            <a:schemeClr val="accent1"/>
+          </a:fillRef>
+          <a:effectRef idx="1">
+            <a:schemeClr val="accent1"/>
+          </a:effectRef>
+          <a:fontRef idx="minor">
+            <a:schemeClr val="tx1"/>
+          </a:fontRef>
+        </p:style>
+      </p:cxnSp>
+      <p:cxnSp>
+        <p:nvCxnSpPr>
+          <p:cNvPr id="70" name="Прямая со стрелкой 69"/>
+          <p:cNvCxnSpPr>
+            <a:stCxn id="18" idx="2"/>
+            <a:endCxn id="9" idx="0"/>
+          </p:cNvCxnSpPr>
+          <p:nvPr/>
+        </p:nvCxnSpPr>
+        <p:spPr>
+          <a:xfrm>
+            <a:off x="4258469" y="3919347"/>
+            <a:ext cx="1427956" cy="243049"/>
+          </a:xfrm>
+          <a:prstGeom prst="straightConnector1">
+            <a:avLst/>
+          </a:prstGeom>
+          <a:ln>
+            <a:tailEnd type="triangle"/>
+          </a:ln>
+        </p:spPr>
+        <p:style>
+          <a:lnRef idx="2">
+            <a:schemeClr val="accent1"/>
+          </a:lnRef>
+          <a:fillRef idx="0">
+            <a:schemeClr val="accent1"/>
+          </a:fillRef>
+          <a:effectRef idx="1">
+            <a:schemeClr val="accent1"/>
+          </a:effectRef>
+          <a:fontRef idx="minor">
+            <a:schemeClr val="tx1"/>
+          </a:fontRef>
+        </p:style>
+      </p:cxnSp>
+      <p:cxnSp>
+        <p:nvCxnSpPr>
+          <p:cNvPr id="74" name="Прямая со стрелкой 73"/>
+          <p:cNvCxnSpPr>
+            <a:stCxn id="18" idx="0"/>
+            <a:endCxn id="11" idx="2"/>
+          </p:cNvCxnSpPr>
+          <p:nvPr/>
+        </p:nvCxnSpPr>
+        <p:spPr>
+          <a:xfrm flipH="1" flipV="1">
+            <a:off x="3340099" y="1346168"/>
+            <a:ext cx="918370" cy="2065179"/>
+          </a:xfrm>
+          <a:prstGeom prst="straightConnector1">
+            <a:avLst/>
+          </a:prstGeom>
+          <a:ln>
+            <a:tailEnd type="triangle"/>
+          </a:ln>
+        </p:spPr>
+        <p:style>
+          <a:lnRef idx="2">
+            <a:schemeClr val="accent1"/>
+          </a:lnRef>
+          <a:fillRef idx="0">
+            <a:schemeClr val="accent1"/>
+          </a:fillRef>
+          <a:effectRef idx="1">
+            <a:schemeClr val="accent1"/>
+          </a:effectRef>
+          <a:fontRef idx="minor">
+            <a:schemeClr val="tx1"/>
+          </a:fontRef>
+        </p:style>
+      </p:cxnSp>
+      <p:cxnSp>
+        <p:nvCxnSpPr>
+          <p:cNvPr id="78" name="Прямая со стрелкой 77"/>
+          <p:cNvCxnSpPr>
+            <a:stCxn id="17" idx="3"/>
+            <a:endCxn id="10" idx="1"/>
+          </p:cNvCxnSpPr>
+          <p:nvPr/>
+        </p:nvCxnSpPr>
+        <p:spPr>
+          <a:xfrm>
+            <a:off x="3572271" y="2332833"/>
+            <a:ext cx="1907786" cy="245999"/>
+          </a:xfrm>
+          <a:prstGeom prst="straightConnector1">
+            <a:avLst/>
+          </a:prstGeom>
+          <a:ln>
+            <a:tailEnd type="triangle"/>
+          </a:ln>
+        </p:spPr>
+        <p:style>
+          <a:lnRef idx="2">
+            <a:schemeClr val="accent1"/>
+          </a:lnRef>
+          <a:fillRef idx="0">
+            <a:schemeClr val="accent1"/>
+          </a:fillRef>
+          <a:effectRef idx="1">
+            <a:schemeClr val="accent1"/>
+          </a:effectRef>
+          <a:fontRef idx="minor">
+            <a:schemeClr val="tx1"/>
+          </a:fontRef>
+        </p:style>
+      </p:cxnSp>
+      <p:sp>
+        <p:nvSpPr>
+          <p:cNvPr id="79" name="Прямоугольник 78"/>
+          <p:cNvSpPr/>
+          <p:nvPr/>
+        </p:nvSpPr>
+        <p:spPr>
+          <a:xfrm>
+            <a:off x="1736326" y="4204496"/>
+            <a:ext cx="1222375" cy="508000"/>
+          </a:xfrm>
+          <a:prstGeom prst="rect">
+            <a:avLst/>
+          </a:prstGeom>
+          <a:solidFill>
+            <a:schemeClr val="accent4"/>
+          </a:solidFill>
+          <a:ln>
+            <a:solidFill>
+              <a:schemeClr val="tx1"/>
+            </a:solidFill>
+          </a:ln>
+          <a:effectLst/>
+        </p:spPr>
+        <p:style>
+          <a:lnRef idx="1">
+            <a:schemeClr val="accent1"/>
+          </a:lnRef>
+          <a:fillRef idx="3">
+            <a:schemeClr val="accent1"/>
+          </a:fillRef>
+          <a:effectRef idx="2">
+            <a:schemeClr val="accent1"/>
+          </a:effectRef>
+          <a:fontRef idx="minor">
+            <a:schemeClr val="lt1"/>
+          </a:fontRef>
+        </p:style>
+        <p:txBody>
+          <a:bodyPr rtlCol="0" anchor="ctr"/>
+          <a:lstStyle/>
+          <a:p>
+            <a:pPr algn="ctr"/>
+            <a:r>
+              <a:rPr lang="en-US" dirty="0" smtClean="0"/>
+              <a:t>Notifications</a:t>
+            </a:r>
+            <a:endParaRPr lang="ru-RU" dirty="0"/>
+          </a:p>
+        </p:txBody>
+      </p:sp>
+      <p:cxnSp>
+        <p:nvCxnSpPr>
+          <p:cNvPr id="81" name="Прямая со стрелкой 80"/>
+          <p:cNvCxnSpPr>
+            <a:stCxn id="18" idx="2"/>
+            <a:endCxn id="79" idx="0"/>
+          </p:cNvCxnSpPr>
+          <p:nvPr/>
+        </p:nvCxnSpPr>
+        <p:spPr>
+          <a:xfrm flipH="1">
+            <a:off x="2347514" y="3919347"/>
+            <a:ext cx="1910955" cy="285149"/>
+          </a:xfrm>
+          <a:prstGeom prst="straightConnector1">
+            <a:avLst/>
+          </a:prstGeom>
+          <a:ln>
+            <a:tailEnd type="triangle"/>
+          </a:ln>
+        </p:spPr>
+        <p:style>
+          <a:lnRef idx="2">
+            <a:schemeClr val="accent1"/>
+          </a:lnRef>
+          <a:fillRef idx="0">
+            <a:schemeClr val="accent1"/>
+          </a:fillRef>
+          <a:effectRef idx="1">
+            <a:schemeClr val="accent1"/>
+          </a:effectRef>
+          <a:fontRef idx="minor">
+            <a:schemeClr val="tx1"/>
+          </a:fontRef>
+        </p:style>
+      </p:cxnSp>
+      <p:cxnSp>
+        <p:nvCxnSpPr>
+          <p:cNvPr id="83" name="Прямая со стрелкой 82"/>
+          <p:cNvCxnSpPr>
+            <a:stCxn id="17" idx="2"/>
+            <a:endCxn id="79" idx="0"/>
+          </p:cNvCxnSpPr>
+          <p:nvPr/>
+        </p:nvCxnSpPr>
+        <p:spPr>
+          <a:xfrm flipH="1">
+            <a:off x="2347514" y="2586833"/>
+            <a:ext cx="613570" cy="1617663"/>
+          </a:xfrm>
+          <a:prstGeom prst="straightConnector1">
+            <a:avLst/>
+          </a:prstGeom>
+          <a:ln>
+            <a:tailEnd type="triangle"/>
+          </a:ln>
+        </p:spPr>
+        <p:style>
+          <a:lnRef idx="2">
+            <a:schemeClr val="accent1"/>
+          </a:lnRef>
+          <a:fillRef idx="0">
+            <a:schemeClr val="accent1"/>
+          </a:fillRef>
+          <a:effectRef idx="1">
+            <a:schemeClr val="accent1"/>
+          </a:effectRef>
+          <a:fontRef idx="minor">
+            <a:schemeClr val="tx1"/>
+          </a:fontRef>
+        </p:style>
+      </p:cxnSp>
+    </p:spTree>
+    <p:extLst>
+      <p:ext uri="{BB962C8B-B14F-4D97-AF65-F5344CB8AC3E}">
+        <p14:creationId xmlns:p14="http://schemas.microsoft.com/office/powerpoint/2010/main" val="1126298809"/>
+      </p:ext>
+    </p:extLst>
+  </p:cSld>
+  <p:clrMapOvr>
+    <a:masterClrMapping/>
+  </p:clrMapOvr>
+</p:sld>
+</file>
+
+<file path=ppt/slides/slide32.xml><?xml version="1.0" encoding="utf-8"?>
+<p:sld xmlns:a="http://schemas.openxmlformats.org/drawingml/2006/main" xmlns:r="http://schemas.openxmlformats.org/officeDocument/2006/relationships" xmlns:p="http://schemas.openxmlformats.org/presentationml/2006/main">
+  <p:cSld>
+    <p:spTree>
+      <p:nvGrpSpPr>
+        <p:cNvPr id="1" name=""/>
+        <p:cNvGrpSpPr/>
+        <p:nvPr/>
+      </p:nvGrpSpPr>
+      <p:grpSpPr>
+        <a:xfrm>
+          <a:off x="0" y="0"/>
+          <a:ext cx="0" cy="0"/>
+          <a:chOff x="0" y="0"/>
+          <a:chExt cx="0" cy="0"/>
+        </a:xfrm>
+      </p:grpSpPr>
+      <p:sp>
+        <p:nvSpPr>
+          <p:cNvPr id="3" name="Text Placeholder 2"/>
+          <p:cNvSpPr>
+            <a:spLocks noGrp="1"/>
+          </p:cNvSpPr>
+          <p:nvPr>
+            <p:ph type="body" sz="quarter" idx="11"/>
+          </p:nvPr>
+        </p:nvSpPr>
+        <p:spPr/>
+        <p:txBody>
+          <a:bodyPr/>
+          <a:lstStyle/>
+          <a:p>
+            <a:r>
+              <a:rPr lang="en-US" dirty="0" smtClean="0"/>
+              <a:t>When to use </a:t>
+            </a:r>
+            <a:r>
+              <a:rPr lang="en-US" dirty="0" err="1" smtClean="0"/>
+              <a:t>Microservices</a:t>
+            </a:r>
+            <a:endParaRPr lang="en-US" dirty="0"/>
+          </a:p>
+        </p:txBody>
+      </p:sp>
+      <p:sp>
+        <p:nvSpPr>
+          <p:cNvPr id="4" name="Прямоугольник 3"/>
+          <p:cNvSpPr/>
+          <p:nvPr/>
+        </p:nvSpPr>
+        <p:spPr>
+          <a:xfrm>
+            <a:off x="120937" y="685172"/>
+            <a:ext cx="6465601" cy="3539430"/>
+          </a:xfrm>
+          <a:prstGeom prst="rect">
+            <a:avLst/>
+          </a:prstGeom>
+        </p:spPr>
+        <p:txBody>
+          <a:bodyPr wrap="square">
+            <a:spAutoFit/>
+          </a:bodyPr>
+          <a:lstStyle/>
+          <a:p>
+            <a:pPr marL="571500" indent="-571500">
+              <a:lnSpc>
+                <a:spcPct val="200000"/>
+              </a:lnSpc>
+              <a:buClr>
+                <a:schemeClr val="accent3">
+                  <a:lumMod val="75000"/>
+                </a:schemeClr>
+              </a:buClr>
+              <a:buFont typeface="Arial" pitchFamily="34" charset="0"/>
+              <a:buChar char="•"/>
+            </a:pPr>
+            <a:r>
+              <a:rPr lang="en-US" sz="2800" dirty="0" smtClean="0">
+                <a:solidFill>
+                  <a:srgbClr val="444444"/>
+                </a:solidFill>
+                <a:cs typeface="Trebuchet MS"/>
+              </a:rPr>
+              <a:t>System is too big</a:t>
+            </a:r>
+            <a:endParaRPr lang="ru-RU" sz="2800" dirty="0">
+              <a:solidFill>
+                <a:srgbClr val="444444"/>
+              </a:solidFill>
+              <a:cs typeface="Trebuchet MS"/>
+            </a:endParaRPr>
+          </a:p>
+          <a:p>
+            <a:pPr marL="571500" indent="-571500">
+              <a:lnSpc>
+                <a:spcPct val="200000"/>
+              </a:lnSpc>
+              <a:buClr>
+                <a:schemeClr val="accent3">
+                  <a:lumMod val="75000"/>
+                </a:schemeClr>
+              </a:buClr>
+              <a:buFont typeface="Arial" pitchFamily="34" charset="0"/>
+              <a:buChar char="•"/>
+            </a:pPr>
+            <a:r>
+              <a:rPr lang="en-US" sz="2800" dirty="0" smtClean="0">
+                <a:solidFill>
+                  <a:srgbClr val="444444"/>
+                </a:solidFill>
+                <a:cs typeface="Trebuchet MS"/>
+              </a:rPr>
+              <a:t>Team is too big</a:t>
+            </a:r>
+            <a:endParaRPr lang="ru-RU" sz="2800" dirty="0">
+              <a:solidFill>
+                <a:srgbClr val="444444"/>
+              </a:solidFill>
+              <a:cs typeface="Trebuchet MS"/>
+            </a:endParaRPr>
+          </a:p>
+          <a:p>
+            <a:pPr marL="571500" indent="-571500">
+              <a:lnSpc>
+                <a:spcPct val="200000"/>
+              </a:lnSpc>
+              <a:buClr>
+                <a:schemeClr val="accent3">
+                  <a:lumMod val="75000"/>
+                </a:schemeClr>
+              </a:buClr>
+              <a:buFont typeface="Arial" pitchFamily="34" charset="0"/>
+              <a:buChar char="•"/>
+            </a:pPr>
+            <a:r>
+              <a:rPr lang="en-US" sz="2800" dirty="0" smtClean="0">
+                <a:solidFill>
+                  <a:srgbClr val="444444"/>
+                </a:solidFill>
+                <a:cs typeface="Trebuchet MS"/>
+              </a:rPr>
+              <a:t>System is too complicated</a:t>
+            </a:r>
+            <a:endParaRPr lang="ru-RU" sz="2800" dirty="0">
+              <a:solidFill>
+                <a:srgbClr val="444444"/>
+              </a:solidFill>
+              <a:cs typeface="Trebuchet MS"/>
+            </a:endParaRPr>
+          </a:p>
+          <a:p>
+            <a:pPr marL="571500" indent="-571500">
+              <a:lnSpc>
+                <a:spcPct val="200000"/>
+              </a:lnSpc>
+              <a:buClr>
+                <a:schemeClr val="accent3">
+                  <a:lumMod val="75000"/>
+                </a:schemeClr>
+              </a:buClr>
+              <a:buFont typeface="Arial" pitchFamily="34" charset="0"/>
+              <a:buChar char="•"/>
+            </a:pPr>
+            <a:r>
+              <a:rPr lang="en-US" sz="2800" dirty="0" smtClean="0">
+                <a:solidFill>
+                  <a:srgbClr val="444444"/>
+                </a:solidFill>
+                <a:cs typeface="Trebuchet MS"/>
+              </a:rPr>
+              <a:t>System is too new</a:t>
+            </a:r>
+            <a:endParaRPr lang="ru-RU" sz="2800" dirty="0">
+              <a:solidFill>
+                <a:srgbClr val="444444"/>
+              </a:solidFill>
+              <a:cs typeface="Trebuchet MS"/>
+            </a:endParaRPr>
+          </a:p>
+        </p:txBody>
+      </p:sp>
+    </p:spTree>
+    <p:extLst>
+      <p:ext uri="{BB962C8B-B14F-4D97-AF65-F5344CB8AC3E}">
+        <p14:creationId xmlns:p14="http://schemas.microsoft.com/office/powerpoint/2010/main" val="312215911"/>
+      </p:ext>
+    </p:extLst>
+  </p:cSld>
+  <p:clrMapOvr>
+    <a:masterClrMapping/>
+  </p:clrMapOvr>
+  <p:timing>
+    <p:tnLst>
+      <p:par>
+        <p:cTn id="1" dur="indefinite" restart="never" nodeType="tmRoot"/>
+      </p:par>
+    </p:tnLst>
+  </p:timing>
+</p:sld>
+</file>
+
+<file path=ppt/slides/slide33.xml><?xml version="1.0" encoding="utf-8"?>
+<p:sld xmlns:a="http://schemas.openxmlformats.org/drawingml/2006/main" xmlns:r="http://schemas.openxmlformats.org/officeDocument/2006/relationships" xmlns:p="http://schemas.openxmlformats.org/presentationml/2006/main">
+  <p:cSld>
+    <p:spTree>
+      <p:nvGrpSpPr>
+        <p:cNvPr id="1" name=""/>
+        <p:cNvGrpSpPr/>
+        <p:nvPr/>
+      </p:nvGrpSpPr>
+      <p:grpSpPr>
+        <a:xfrm>
+          <a:off x="0" y="0"/>
+          <a:ext cx="0" cy="0"/>
+          <a:chOff x="0" y="0"/>
+          <a:chExt cx="0" cy="0"/>
+        </a:xfrm>
+      </p:grpSpPr>
+      <p:pic>
+        <p:nvPicPr>
           <p:cNvPr id="42" name="Picture 2" descr="http://www.voxmagazine.com/wp-content/uploads/2014/09/QA.png"/>
           <p:cNvPicPr>
             <a:picLocks noChangeAspect="1" noChangeArrowheads="1"/>
@@ -29854,7 +32930,7 @@
 </p:sld>
 </file>
 
-<file path=ppt/slides/slide31.xml><?xml version="1.0" encoding="utf-8"?>
+<file path=ppt/slides/slide34.xml><?xml version="1.0" encoding="utf-8"?>
 <p:sld xmlns:a="http://schemas.openxmlformats.org/drawingml/2006/main" xmlns:r="http://schemas.openxmlformats.org/officeDocument/2006/relationships" xmlns:p="http://schemas.openxmlformats.org/presentationml/2006/main">
   <p:cSld>
     <p:spTree>
@@ -30169,7 +33245,6 @@
               <a:rPr lang="en-US" dirty="0"/>
               <a:t>Infrastructure</a:t>
             </a:r>
-            <a:endParaRPr lang="en-US" dirty="0"/>
           </a:p>
         </p:txBody>
       </p:sp>
@@ -32700,21 +35775,21 @@
 </file>
 
 <file path=customXml/item2.xml><?xml version="1.0" encoding="utf-8"?>
+<?mso-contentType ?>
+<FormTemplates xmlns="http://schemas.microsoft.com/sharepoint/v3/contenttype/forms">
+  <Display>DocumentLibraryForm</Display>
+  <Edit>DocumentLibraryForm</Edit>
+  <New>DocumentLibraryForm</New>
+</FormTemplates>
+</file>
+
+<file path=customXml/item3.xml><?xml version="1.0" encoding="utf-8"?>
 <p:properties xmlns:p="http://schemas.microsoft.com/office/2006/metadata/properties" xmlns:xsi="http://www.w3.org/2001/XMLSchema-instance" xmlns:pc="http://schemas.microsoft.com/office/infopath/2007/PartnerControls">
   <documentManagement>
     <PublishingExpirationDate xmlns="http://schemas.microsoft.com/sharepoint/v3" xsi:nil="true"/>
     <PublishingStartDate xmlns="http://schemas.microsoft.com/sharepoint/v3" xsi:nil="true"/>
   </documentManagement>
 </p:properties>
-</file>
-
-<file path=customXml/item3.xml><?xml version="1.0" encoding="utf-8"?>
-<?mso-contentType ?>
-<FormTemplates xmlns="http://schemas.microsoft.com/sharepoint/v3/contenttype/forms">
-  <Display>DocumentLibraryForm</Display>
-  <Edit>DocumentLibraryForm</Edit>
-  <New>DocumentLibraryForm</New>
-</FormTemplates>
 </file>
 
 <file path=customXml/itemProps1.xml><?xml version="1.0" encoding="utf-8"?>
@@ -32736,6 +35811,14 @@
 </file>
 
 <file path=customXml/itemProps2.xml><?xml version="1.0" encoding="utf-8"?>
+<ds:datastoreItem xmlns:ds="http://schemas.openxmlformats.org/officeDocument/2006/customXml" ds:itemID="{14883F0F-DE57-4ECA-B9BB-F22E8C5B5D82}">
+  <ds:schemaRefs>
+    <ds:schemaRef ds:uri="http://schemas.microsoft.com/sharepoint/v3/contenttype/forms"/>
+  </ds:schemaRefs>
+</ds:datastoreItem>
+</file>
+
+<file path=customXml/itemProps3.xml><?xml version="1.0" encoding="utf-8"?>
 <ds:datastoreItem xmlns:ds="http://schemas.openxmlformats.org/officeDocument/2006/customXml" ds:itemID="{D5E3C081-4081-47AD-A9A6-9F18F525DA1D}">
   <ds:schemaRefs>
     <ds:schemaRef ds:uri="http://schemas.microsoft.com/office/2006/documentManagement/types"/>
@@ -32749,12 +35832,4 @@
     <ds:schemaRef ds:uri="http://purl.org/dc/elements/1.1/"/>
   </ds:schemaRefs>
 </ds:datastoreItem>
-</file>
-
-<file path=customXml/itemProps3.xml><?xml version="1.0" encoding="utf-8"?>
-<ds:datastoreItem xmlns:ds="http://schemas.openxmlformats.org/officeDocument/2006/customXml" ds:itemID="{14883F0F-DE57-4ECA-B9BB-F22E8C5B5D82}">
-  <ds:schemaRefs>
-    <ds:schemaRef ds:uri="http://schemas.microsoft.com/sharepoint/v3/contenttype/forms"/>
-  </ds:schemaRefs>
-</ds:datastoreItem>
 </file>
</xml_diff>